<commit_message>
started r-markdown and updated pptx
</commit_message>
<xml_diff>
--- a/Student Alcohol Consumption Data Science Project.pptx
+++ b/Student Alcohol Consumption Data Science Project.pptx
@@ -29,16 +29,16 @@
     <p:sldId id="282" r:id="rId17"/>
     <p:sldId id="287" r:id="rId18"/>
     <p:sldId id="286" r:id="rId19"/>
-    <p:sldId id="263" r:id="rId20"/>
-    <p:sldId id="260" r:id="rId21"/>
-    <p:sldId id="273" r:id="rId22"/>
-    <p:sldId id="274" r:id="rId23"/>
-    <p:sldId id="275" r:id="rId24"/>
-    <p:sldId id="265" r:id="rId25"/>
-    <p:sldId id="262" r:id="rId26"/>
-    <p:sldId id="272" r:id="rId27"/>
-    <p:sldId id="264" r:id="rId28"/>
-    <p:sldId id="266" r:id="rId29"/>
+    <p:sldId id="265" r:id="rId20"/>
+    <p:sldId id="266" r:id="rId21"/>
+    <p:sldId id="263" r:id="rId22"/>
+    <p:sldId id="260" r:id="rId23"/>
+    <p:sldId id="273" r:id="rId24"/>
+    <p:sldId id="274" r:id="rId25"/>
+    <p:sldId id="275" r:id="rId26"/>
+    <p:sldId id="262" r:id="rId27"/>
+    <p:sldId id="272" r:id="rId28"/>
+    <p:sldId id="264" r:id="rId29"/>
   </p:sldIdLst>
   <p:sldSz cx="12192000" cy="6858000"/>
   <p:notesSz cx="6858000" cy="9144000"/>
@@ -3893,33 +3893,33 @@
     </dgm:pt>
   </dgm:ptLst>
   <dgm:cxnLst>
-    <dgm:cxn modelId="{3F4BEE9E-8D26-4AD2-ADA0-D76B4E28C08E}" type="presOf" srcId="{981C2CD8-7E8A-4682-8B5A-A510268B34AC}" destId="{C084451C-3DBC-48CF-A871-B521FE90830A}" srcOrd="0" destOrd="0" presId="urn:microsoft.com/office/officeart/2005/8/layout/process3"/>
+    <dgm:cxn modelId="{93006ACD-B004-4B1F-B0D0-6C85222A28DE}" type="presOf" srcId="{EB5FE175-6B6D-4195-A86F-6DFA96778160}" destId="{ADE18D45-E3E4-4C40-8D6C-3AC62ACE8299}" srcOrd="1" destOrd="0" presId="urn:microsoft.com/office/officeart/2005/8/layout/process3"/>
     <dgm:cxn modelId="{F188FC37-C998-4CDB-85A2-EBB389808248}" type="presOf" srcId="{981C2CD8-7E8A-4682-8B5A-A510268B34AC}" destId="{B29D4F23-83F6-4C7C-9B29-72BF90EFE2CC}" srcOrd="1" destOrd="0" presId="urn:microsoft.com/office/officeart/2005/8/layout/process3"/>
+    <dgm:cxn modelId="{9197A1EF-40BA-4A00-90BC-61CBC94FE8A7}" type="presOf" srcId="{3C06DC45-D510-48CC-B9DC-C19564791119}" destId="{9AFA4903-C1AC-4872-B8FC-33B461DA35FC}" srcOrd="0" destOrd="0" presId="urn:microsoft.com/office/officeart/2005/8/layout/process3"/>
+    <dgm:cxn modelId="{63D5015B-3865-4A4B-AEB1-FBEF0DE71B9A}" srcId="{CADE50C9-6A62-45AC-AF42-A90DC46A3209}" destId="{DC2DF88C-35A0-4E30-A3E4-E002DC34F521}" srcOrd="2" destOrd="0" parTransId="{9BB88C43-2261-4EC7-A70D-463964685938}" sibTransId="{4DFC88DE-E0F0-4976-9B83-58EADA7CE300}"/>
+    <dgm:cxn modelId="{654B2758-BB63-4A67-9FA8-BFB78F357825}" type="presOf" srcId="{DC2DF88C-35A0-4E30-A3E4-E002DC34F521}" destId="{D297B747-A2CF-41E4-A59D-391BC474F135}" srcOrd="0" destOrd="0" presId="urn:microsoft.com/office/officeart/2005/8/layout/process3"/>
     <dgm:cxn modelId="{C0883AEA-830B-4AD2-96BF-9E39D8362AB2}" type="presOf" srcId="{DC2DF88C-35A0-4E30-A3E4-E002DC34F521}" destId="{ABF185BD-956E-4777-8763-980278E426BB}" srcOrd="1" destOrd="0" presId="urn:microsoft.com/office/officeart/2005/8/layout/process3"/>
     <dgm:cxn modelId="{B2733D3B-E352-4F5C-889A-1B9ECD5F8F60}" type="presOf" srcId="{EB5FE175-6B6D-4195-A86F-6DFA96778160}" destId="{B4B2D37A-6F50-4E0F-B305-9EB4D512D773}" srcOrd="0" destOrd="0" presId="urn:microsoft.com/office/officeart/2005/8/layout/process3"/>
+    <dgm:cxn modelId="{5BDE1DA6-E08E-43FF-BCA1-46EC3454F22A}" type="presOf" srcId="{5F712884-449D-4DB5-9953-28B7C76B95EA}" destId="{EF3A946E-96B3-4628-91EB-8B0A2A37DDB1}" srcOrd="0" destOrd="0" presId="urn:microsoft.com/office/officeart/2005/8/layout/process3"/>
+    <dgm:cxn modelId="{7C7C1ACA-D121-4A09-BFF4-2A57A30D871A}" type="presOf" srcId="{D7467A3A-2B78-4CDD-91C9-D96452997227}" destId="{84DC82A2-8D59-472B-BE22-46F053C16CD5}" srcOrd="0" destOrd="0" presId="urn:microsoft.com/office/officeart/2005/8/layout/process3"/>
+    <dgm:cxn modelId="{D998B319-C072-4BF0-B5CB-2075DB30B691}" srcId="{DC2DF88C-35A0-4E30-A3E4-E002DC34F521}" destId="{DF9FD532-8B13-446E-B6A3-59BDF574BCA8}" srcOrd="0" destOrd="0" parTransId="{3A79FA23-5F3F-4F7D-B4AC-A9C282166E18}" sibTransId="{31B32A6E-6E91-4EAA-96F6-92A0035B120A}"/>
+    <dgm:cxn modelId="{AABA8D8C-E800-4FDC-8C5F-A5D82041D563}" type="presOf" srcId="{CF1FE966-0BB0-47ED-84B3-EC7AB055925F}" destId="{032BAEB6-0FB1-4780-AF60-2EFB8C965C77}" srcOrd="0" destOrd="0" presId="urn:microsoft.com/office/officeart/2005/8/layout/process3"/>
     <dgm:cxn modelId="{D95BF8C4-EEA0-4AAE-8693-AFAC7500B286}" srcId="{CADE50C9-6A62-45AC-AF42-A90DC46A3209}" destId="{981C2CD8-7E8A-4682-8B5A-A510268B34AC}" srcOrd="1" destOrd="0" parTransId="{1185AE54-EDEE-4D55-93F6-F7D354ED7C11}" sibTransId="{D7467A3A-2B78-4CDD-91C9-D96452997227}"/>
+    <dgm:cxn modelId="{5BBBD0A9-97DA-480E-AD44-1947C76CE5E6}" srcId="{CADE50C9-6A62-45AC-AF42-A90DC46A3209}" destId="{5F712884-449D-4DB5-9953-28B7C76B95EA}" srcOrd="0" destOrd="0" parTransId="{959B81DB-0329-4043-A334-D05EB5160B66}" sibTransId="{EB5FE175-6B6D-4195-A86F-6DFA96778160}"/>
+    <dgm:cxn modelId="{2A4D48E1-6639-4AC8-ABBF-C8A0D045AFB7}" srcId="{F5961DD5-682B-4D21-A827-30C64679BB5F}" destId="{72DB7378-4256-4528-8672-DEEF82828E57}" srcOrd="0" destOrd="0" parTransId="{97CEFC59-E261-4652-BC13-D71B45B5EC50}" sibTransId="{D0054105-F7A3-4CAE-89E2-0979360A932C}"/>
+    <dgm:cxn modelId="{7A81218D-5146-40F9-9731-5BD21503537E}" srcId="{981C2CD8-7E8A-4682-8B5A-A510268B34AC}" destId="{CF1FE966-0BB0-47ED-84B3-EC7AB055925F}" srcOrd="0" destOrd="0" parTransId="{FB956851-3BB2-4FF1-A9D6-4692FA0EFDCA}" sibTransId="{831C3CE2-0F23-433C-85CA-9D194AAC5E20}"/>
     <dgm:cxn modelId="{6C7842C7-2928-4666-A7BA-454C6506C36C}" type="presOf" srcId="{4DFC88DE-E0F0-4976-9B83-58EADA7CE300}" destId="{7E8F3DD0-4BD8-4C40-B882-1E8B5E423D90}" srcOrd="1" destOrd="0" presId="urn:microsoft.com/office/officeart/2005/8/layout/process3"/>
-    <dgm:cxn modelId="{7A81218D-5146-40F9-9731-5BD21503537E}" srcId="{981C2CD8-7E8A-4682-8B5A-A510268B34AC}" destId="{CF1FE966-0BB0-47ED-84B3-EC7AB055925F}" srcOrd="0" destOrd="0" parTransId="{FB956851-3BB2-4FF1-A9D6-4692FA0EFDCA}" sibTransId="{831C3CE2-0F23-433C-85CA-9D194AAC5E20}"/>
+    <dgm:cxn modelId="{55246683-0A80-455D-B6B5-2B2736293CF2}" srcId="{5F712884-449D-4DB5-9953-28B7C76B95EA}" destId="{3C06DC45-D510-48CC-B9DC-C19564791119}" srcOrd="0" destOrd="0" parTransId="{65F5C7C6-EB25-442A-AB0B-B47F97609474}" sibTransId="{D1AB7263-DC38-4830-9C45-C1403EA8E20B}"/>
+    <dgm:cxn modelId="{461E3B8D-CDD4-4E38-A9CC-325E95F35F5C}" type="presOf" srcId="{72DB7378-4256-4528-8672-DEEF82828E57}" destId="{893E387F-15C0-4F86-BCD4-13F52E420B46}" srcOrd="0" destOrd="0" presId="urn:microsoft.com/office/officeart/2005/8/layout/process3"/>
+    <dgm:cxn modelId="{7A63044C-EE1D-4724-9059-4496B4425527}" type="presOf" srcId="{F5961DD5-682B-4D21-A827-30C64679BB5F}" destId="{4858D85A-2D02-42C7-A50A-A4E78D4F073F}" srcOrd="0" destOrd="0" presId="urn:microsoft.com/office/officeart/2005/8/layout/process3"/>
+    <dgm:cxn modelId="{BB6865B8-A688-4FC4-AFAA-E66324174F02}" type="presOf" srcId="{5F712884-449D-4DB5-9953-28B7C76B95EA}" destId="{E252839F-D941-4E3B-BA68-AC653DAEAE4C}" srcOrd="1" destOrd="0" presId="urn:microsoft.com/office/officeart/2005/8/layout/process3"/>
+    <dgm:cxn modelId="{73708078-FDBA-43F4-96AB-FB14C4C2602F}" srcId="{CADE50C9-6A62-45AC-AF42-A90DC46A3209}" destId="{F5961DD5-682B-4D21-A827-30C64679BB5F}" srcOrd="3" destOrd="0" parTransId="{75D73089-01C8-4BC0-90ED-CA9D1B8E3ADF}" sibTransId="{CA7ED3B0-10D1-4E2F-8BA0-8D58C22A94D0}"/>
+    <dgm:cxn modelId="{37CFE086-8264-4424-B1D0-18A97A56AF66}" type="presOf" srcId="{4DFC88DE-E0F0-4976-9B83-58EADA7CE300}" destId="{14AD0DAF-92D3-400A-A4E0-170D0AF84100}" srcOrd="0" destOrd="0" presId="urn:microsoft.com/office/officeart/2005/8/layout/process3"/>
+    <dgm:cxn modelId="{A5C9FCE5-8766-426B-B5BE-B83931DD52CA}" type="presOf" srcId="{D7467A3A-2B78-4CDD-91C9-D96452997227}" destId="{E38B4FCE-9678-4085-AB99-40595BD6EB1C}" srcOrd="1" destOrd="0" presId="urn:microsoft.com/office/officeart/2005/8/layout/process3"/>
+    <dgm:cxn modelId="{3F4BEE9E-8D26-4AD2-ADA0-D76B4E28C08E}" type="presOf" srcId="{981C2CD8-7E8A-4682-8B5A-A510268B34AC}" destId="{C084451C-3DBC-48CF-A871-B521FE90830A}" srcOrd="0" destOrd="0" presId="urn:microsoft.com/office/officeart/2005/8/layout/process3"/>
     <dgm:cxn modelId="{47BAA679-3D6E-4A1A-91AA-9E404EE6A4CB}" type="presOf" srcId="{F5961DD5-682B-4D21-A827-30C64679BB5F}" destId="{D685B160-AC57-41A0-95FE-636A4391B913}" srcOrd="1" destOrd="0" presId="urn:microsoft.com/office/officeart/2005/8/layout/process3"/>
-    <dgm:cxn modelId="{AABA8D8C-E800-4FDC-8C5F-A5D82041D563}" type="presOf" srcId="{CF1FE966-0BB0-47ED-84B3-EC7AB055925F}" destId="{032BAEB6-0FB1-4780-AF60-2EFB8C965C77}" srcOrd="0" destOrd="0" presId="urn:microsoft.com/office/officeart/2005/8/layout/process3"/>
-    <dgm:cxn modelId="{A5C9FCE5-8766-426B-B5BE-B83931DD52CA}" type="presOf" srcId="{D7467A3A-2B78-4CDD-91C9-D96452997227}" destId="{E38B4FCE-9678-4085-AB99-40595BD6EB1C}" srcOrd="1" destOrd="0" presId="urn:microsoft.com/office/officeart/2005/8/layout/process3"/>
-    <dgm:cxn modelId="{7C7C1ACA-D121-4A09-BFF4-2A57A30D871A}" type="presOf" srcId="{D7467A3A-2B78-4CDD-91C9-D96452997227}" destId="{84DC82A2-8D59-472B-BE22-46F053C16CD5}" srcOrd="0" destOrd="0" presId="urn:microsoft.com/office/officeart/2005/8/layout/process3"/>
-    <dgm:cxn modelId="{461E3B8D-CDD4-4E38-A9CC-325E95F35F5C}" type="presOf" srcId="{72DB7378-4256-4528-8672-DEEF82828E57}" destId="{893E387F-15C0-4F86-BCD4-13F52E420B46}" srcOrd="0" destOrd="0" presId="urn:microsoft.com/office/officeart/2005/8/layout/process3"/>
-    <dgm:cxn modelId="{93006ACD-B004-4B1F-B0D0-6C85222A28DE}" type="presOf" srcId="{EB5FE175-6B6D-4195-A86F-6DFA96778160}" destId="{ADE18D45-E3E4-4C40-8D6C-3AC62ACE8299}" srcOrd="1" destOrd="0" presId="urn:microsoft.com/office/officeart/2005/8/layout/process3"/>
-    <dgm:cxn modelId="{37CFE086-8264-4424-B1D0-18A97A56AF66}" type="presOf" srcId="{4DFC88DE-E0F0-4976-9B83-58EADA7CE300}" destId="{14AD0DAF-92D3-400A-A4E0-170D0AF84100}" srcOrd="0" destOrd="0" presId="urn:microsoft.com/office/officeart/2005/8/layout/process3"/>
-    <dgm:cxn modelId="{7A63044C-EE1D-4724-9059-4496B4425527}" type="presOf" srcId="{F5961DD5-682B-4D21-A827-30C64679BB5F}" destId="{4858D85A-2D02-42C7-A50A-A4E78D4F073F}" srcOrd="0" destOrd="0" presId="urn:microsoft.com/office/officeart/2005/8/layout/process3"/>
-    <dgm:cxn modelId="{2A4D48E1-6639-4AC8-ABBF-C8A0D045AFB7}" srcId="{F5961DD5-682B-4D21-A827-30C64679BB5F}" destId="{72DB7378-4256-4528-8672-DEEF82828E57}" srcOrd="0" destOrd="0" parTransId="{97CEFC59-E261-4652-BC13-D71B45B5EC50}" sibTransId="{D0054105-F7A3-4CAE-89E2-0979360A932C}"/>
-    <dgm:cxn modelId="{D998B319-C072-4BF0-B5CB-2075DB30B691}" srcId="{DC2DF88C-35A0-4E30-A3E4-E002DC34F521}" destId="{DF9FD532-8B13-446E-B6A3-59BDF574BCA8}" srcOrd="0" destOrd="0" parTransId="{3A79FA23-5F3F-4F7D-B4AC-A9C282166E18}" sibTransId="{31B32A6E-6E91-4EAA-96F6-92A0035B120A}"/>
-    <dgm:cxn modelId="{654B2758-BB63-4A67-9FA8-BFB78F357825}" type="presOf" srcId="{DC2DF88C-35A0-4E30-A3E4-E002DC34F521}" destId="{D297B747-A2CF-41E4-A59D-391BC474F135}" srcOrd="0" destOrd="0" presId="urn:microsoft.com/office/officeart/2005/8/layout/process3"/>
+    <dgm:cxn modelId="{AF250757-46ED-49A3-A2B4-276D1B47F666}" type="presOf" srcId="{CADE50C9-6A62-45AC-AF42-A90DC46A3209}" destId="{FDB6D5C0-0ED5-4B9D-9E48-126ED2C433C3}" srcOrd="0" destOrd="0" presId="urn:microsoft.com/office/officeart/2005/8/layout/process3"/>
     <dgm:cxn modelId="{762AB07F-C728-41D8-9B57-DB011D1EC3F0}" type="presOf" srcId="{DF9FD532-8B13-446E-B6A3-59BDF574BCA8}" destId="{1526152F-906E-4121-A143-DD130A011105}" srcOrd="0" destOrd="0" presId="urn:microsoft.com/office/officeart/2005/8/layout/process3"/>
-    <dgm:cxn modelId="{55246683-0A80-455D-B6B5-2B2736293CF2}" srcId="{5F712884-449D-4DB5-9953-28B7C76B95EA}" destId="{3C06DC45-D510-48CC-B9DC-C19564791119}" srcOrd="0" destOrd="0" parTransId="{65F5C7C6-EB25-442A-AB0B-B47F97609474}" sibTransId="{D1AB7263-DC38-4830-9C45-C1403EA8E20B}"/>
-    <dgm:cxn modelId="{5BBBD0A9-97DA-480E-AD44-1947C76CE5E6}" srcId="{CADE50C9-6A62-45AC-AF42-A90DC46A3209}" destId="{5F712884-449D-4DB5-9953-28B7C76B95EA}" srcOrd="0" destOrd="0" parTransId="{959B81DB-0329-4043-A334-D05EB5160B66}" sibTransId="{EB5FE175-6B6D-4195-A86F-6DFA96778160}"/>
-    <dgm:cxn modelId="{5BDE1DA6-E08E-43FF-BCA1-46EC3454F22A}" type="presOf" srcId="{5F712884-449D-4DB5-9953-28B7C76B95EA}" destId="{EF3A946E-96B3-4628-91EB-8B0A2A37DDB1}" srcOrd="0" destOrd="0" presId="urn:microsoft.com/office/officeart/2005/8/layout/process3"/>
-    <dgm:cxn modelId="{9197A1EF-40BA-4A00-90BC-61CBC94FE8A7}" type="presOf" srcId="{3C06DC45-D510-48CC-B9DC-C19564791119}" destId="{9AFA4903-C1AC-4872-B8FC-33B461DA35FC}" srcOrd="0" destOrd="0" presId="urn:microsoft.com/office/officeart/2005/8/layout/process3"/>
-    <dgm:cxn modelId="{63D5015B-3865-4A4B-AEB1-FBEF0DE71B9A}" srcId="{CADE50C9-6A62-45AC-AF42-A90DC46A3209}" destId="{DC2DF88C-35A0-4E30-A3E4-E002DC34F521}" srcOrd="2" destOrd="0" parTransId="{9BB88C43-2261-4EC7-A70D-463964685938}" sibTransId="{4DFC88DE-E0F0-4976-9B83-58EADA7CE300}"/>
-    <dgm:cxn modelId="{73708078-FDBA-43F4-96AB-FB14C4C2602F}" srcId="{CADE50C9-6A62-45AC-AF42-A90DC46A3209}" destId="{F5961DD5-682B-4D21-A827-30C64679BB5F}" srcOrd="3" destOrd="0" parTransId="{75D73089-01C8-4BC0-90ED-CA9D1B8E3ADF}" sibTransId="{CA7ED3B0-10D1-4E2F-8BA0-8D58C22A94D0}"/>
-    <dgm:cxn modelId="{BB6865B8-A688-4FC4-AFAA-E66324174F02}" type="presOf" srcId="{5F712884-449D-4DB5-9953-28B7C76B95EA}" destId="{E252839F-D941-4E3B-BA68-AC653DAEAE4C}" srcOrd="1" destOrd="0" presId="urn:microsoft.com/office/officeart/2005/8/layout/process3"/>
-    <dgm:cxn modelId="{AF250757-46ED-49A3-A2B4-276D1B47F666}" type="presOf" srcId="{CADE50C9-6A62-45AC-AF42-A90DC46A3209}" destId="{FDB6D5C0-0ED5-4B9D-9E48-126ED2C433C3}" srcOrd="0" destOrd="0" presId="urn:microsoft.com/office/officeart/2005/8/layout/process3"/>
     <dgm:cxn modelId="{2B1E6CD2-9E99-4BF4-91F4-6569897959CC}" type="presParOf" srcId="{FDB6D5C0-0ED5-4B9D-9E48-126ED2C433C3}" destId="{CFDB6B04-AAD5-42A2-8A40-C0EC4077F01E}" srcOrd="0" destOrd="0" presId="urn:microsoft.com/office/officeart/2005/8/layout/process3"/>
     <dgm:cxn modelId="{1E36B744-698A-4110-8366-45A5C14FAB2F}" type="presParOf" srcId="{CFDB6B04-AAD5-42A2-8A40-C0EC4077F01E}" destId="{EF3A946E-96B3-4628-91EB-8B0A2A37DDB1}" srcOrd="0" destOrd="0" presId="urn:microsoft.com/office/officeart/2005/8/layout/process3"/>
     <dgm:cxn modelId="{A8E72DFA-2E76-423D-B051-4B4AE1F43988}" type="presParOf" srcId="{CFDB6B04-AAD5-42A2-8A40-C0EC4077F01E}" destId="{E252839F-D941-4E3B-BA68-AC653DAEAE4C}" srcOrd="1" destOrd="0" presId="urn:microsoft.com/office/officeart/2005/8/layout/process3"/>
@@ -4820,33 +4820,33 @@
     </dgm:pt>
   </dgm:ptLst>
   <dgm:cxnLst>
+    <dgm:cxn modelId="{3F4BEE9E-8D26-4AD2-ADA0-D76B4E28C08E}" type="presOf" srcId="{981C2CD8-7E8A-4682-8B5A-A510268B34AC}" destId="{C084451C-3DBC-48CF-A871-B521FE90830A}" srcOrd="0" destOrd="0" presId="urn:microsoft.com/office/officeart/2005/8/layout/process3"/>
+    <dgm:cxn modelId="{F188FC37-C998-4CDB-85A2-EBB389808248}" type="presOf" srcId="{981C2CD8-7E8A-4682-8B5A-A510268B34AC}" destId="{B29D4F23-83F6-4C7C-9B29-72BF90EFE2CC}" srcOrd="1" destOrd="0" presId="urn:microsoft.com/office/officeart/2005/8/layout/process3"/>
+    <dgm:cxn modelId="{C0883AEA-830B-4AD2-96BF-9E39D8362AB2}" type="presOf" srcId="{DC2DF88C-35A0-4E30-A3E4-E002DC34F521}" destId="{ABF185BD-956E-4777-8763-980278E426BB}" srcOrd="1" destOrd="0" presId="urn:microsoft.com/office/officeart/2005/8/layout/process3"/>
+    <dgm:cxn modelId="{B2733D3B-E352-4F5C-889A-1B9ECD5F8F60}" type="presOf" srcId="{EB5FE175-6B6D-4195-A86F-6DFA96778160}" destId="{B4B2D37A-6F50-4E0F-B305-9EB4D512D773}" srcOrd="0" destOrd="0" presId="urn:microsoft.com/office/officeart/2005/8/layout/process3"/>
+    <dgm:cxn modelId="{D95BF8C4-EEA0-4AAE-8693-AFAC7500B286}" srcId="{CADE50C9-6A62-45AC-AF42-A90DC46A3209}" destId="{981C2CD8-7E8A-4682-8B5A-A510268B34AC}" srcOrd="1" destOrd="0" parTransId="{1185AE54-EDEE-4D55-93F6-F7D354ED7C11}" sibTransId="{D7467A3A-2B78-4CDD-91C9-D96452997227}"/>
+    <dgm:cxn modelId="{6C7842C7-2928-4666-A7BA-454C6506C36C}" type="presOf" srcId="{4DFC88DE-E0F0-4976-9B83-58EADA7CE300}" destId="{7E8F3DD0-4BD8-4C40-B882-1E8B5E423D90}" srcOrd="1" destOrd="0" presId="urn:microsoft.com/office/officeart/2005/8/layout/process3"/>
+    <dgm:cxn modelId="{7A81218D-5146-40F9-9731-5BD21503537E}" srcId="{981C2CD8-7E8A-4682-8B5A-A510268B34AC}" destId="{CF1FE966-0BB0-47ED-84B3-EC7AB055925F}" srcOrd="0" destOrd="0" parTransId="{FB956851-3BB2-4FF1-A9D6-4692FA0EFDCA}" sibTransId="{831C3CE2-0F23-433C-85CA-9D194AAC5E20}"/>
+    <dgm:cxn modelId="{47BAA679-3D6E-4A1A-91AA-9E404EE6A4CB}" type="presOf" srcId="{F5961DD5-682B-4D21-A827-30C64679BB5F}" destId="{D685B160-AC57-41A0-95FE-636A4391B913}" srcOrd="1" destOrd="0" presId="urn:microsoft.com/office/officeart/2005/8/layout/process3"/>
+    <dgm:cxn modelId="{AABA8D8C-E800-4FDC-8C5F-A5D82041D563}" type="presOf" srcId="{CF1FE966-0BB0-47ED-84B3-EC7AB055925F}" destId="{032BAEB6-0FB1-4780-AF60-2EFB8C965C77}" srcOrd="0" destOrd="0" presId="urn:microsoft.com/office/officeart/2005/8/layout/process3"/>
+    <dgm:cxn modelId="{A5C9FCE5-8766-426B-B5BE-B83931DD52CA}" type="presOf" srcId="{D7467A3A-2B78-4CDD-91C9-D96452997227}" destId="{E38B4FCE-9678-4085-AB99-40595BD6EB1C}" srcOrd="1" destOrd="0" presId="urn:microsoft.com/office/officeart/2005/8/layout/process3"/>
+    <dgm:cxn modelId="{7C7C1ACA-D121-4A09-BFF4-2A57A30D871A}" type="presOf" srcId="{D7467A3A-2B78-4CDD-91C9-D96452997227}" destId="{84DC82A2-8D59-472B-BE22-46F053C16CD5}" srcOrd="0" destOrd="0" presId="urn:microsoft.com/office/officeart/2005/8/layout/process3"/>
+    <dgm:cxn modelId="{461E3B8D-CDD4-4E38-A9CC-325E95F35F5C}" type="presOf" srcId="{72DB7378-4256-4528-8672-DEEF82828E57}" destId="{893E387F-15C0-4F86-BCD4-13F52E420B46}" srcOrd="0" destOrd="0" presId="urn:microsoft.com/office/officeart/2005/8/layout/process3"/>
     <dgm:cxn modelId="{93006ACD-B004-4B1F-B0D0-6C85222A28DE}" type="presOf" srcId="{EB5FE175-6B6D-4195-A86F-6DFA96778160}" destId="{ADE18D45-E3E4-4C40-8D6C-3AC62ACE8299}" srcOrd="1" destOrd="0" presId="urn:microsoft.com/office/officeart/2005/8/layout/process3"/>
-    <dgm:cxn modelId="{F188FC37-C998-4CDB-85A2-EBB389808248}" type="presOf" srcId="{981C2CD8-7E8A-4682-8B5A-A510268B34AC}" destId="{B29D4F23-83F6-4C7C-9B29-72BF90EFE2CC}" srcOrd="1" destOrd="0" presId="urn:microsoft.com/office/officeart/2005/8/layout/process3"/>
+    <dgm:cxn modelId="{37CFE086-8264-4424-B1D0-18A97A56AF66}" type="presOf" srcId="{4DFC88DE-E0F0-4976-9B83-58EADA7CE300}" destId="{14AD0DAF-92D3-400A-A4E0-170D0AF84100}" srcOrd="0" destOrd="0" presId="urn:microsoft.com/office/officeart/2005/8/layout/process3"/>
+    <dgm:cxn modelId="{7A63044C-EE1D-4724-9059-4496B4425527}" type="presOf" srcId="{F5961DD5-682B-4D21-A827-30C64679BB5F}" destId="{4858D85A-2D02-42C7-A50A-A4E78D4F073F}" srcOrd="0" destOrd="0" presId="urn:microsoft.com/office/officeart/2005/8/layout/process3"/>
+    <dgm:cxn modelId="{2A4D48E1-6639-4AC8-ABBF-C8A0D045AFB7}" srcId="{F5961DD5-682B-4D21-A827-30C64679BB5F}" destId="{72DB7378-4256-4528-8672-DEEF82828E57}" srcOrd="0" destOrd="0" parTransId="{97CEFC59-E261-4652-BC13-D71B45B5EC50}" sibTransId="{D0054105-F7A3-4CAE-89E2-0979360A932C}"/>
+    <dgm:cxn modelId="{D998B319-C072-4BF0-B5CB-2075DB30B691}" srcId="{DC2DF88C-35A0-4E30-A3E4-E002DC34F521}" destId="{DF9FD532-8B13-446E-B6A3-59BDF574BCA8}" srcOrd="0" destOrd="0" parTransId="{3A79FA23-5F3F-4F7D-B4AC-A9C282166E18}" sibTransId="{31B32A6E-6E91-4EAA-96F6-92A0035B120A}"/>
+    <dgm:cxn modelId="{654B2758-BB63-4A67-9FA8-BFB78F357825}" type="presOf" srcId="{DC2DF88C-35A0-4E30-A3E4-E002DC34F521}" destId="{D297B747-A2CF-41E4-A59D-391BC474F135}" srcOrd="0" destOrd="0" presId="urn:microsoft.com/office/officeart/2005/8/layout/process3"/>
+    <dgm:cxn modelId="{762AB07F-C728-41D8-9B57-DB011D1EC3F0}" type="presOf" srcId="{DF9FD532-8B13-446E-B6A3-59BDF574BCA8}" destId="{1526152F-906E-4121-A143-DD130A011105}" srcOrd="0" destOrd="0" presId="urn:microsoft.com/office/officeart/2005/8/layout/process3"/>
+    <dgm:cxn modelId="{55246683-0A80-455D-B6B5-2B2736293CF2}" srcId="{5F712884-449D-4DB5-9953-28B7C76B95EA}" destId="{3C06DC45-D510-48CC-B9DC-C19564791119}" srcOrd="0" destOrd="0" parTransId="{65F5C7C6-EB25-442A-AB0B-B47F97609474}" sibTransId="{D1AB7263-DC38-4830-9C45-C1403EA8E20B}"/>
+    <dgm:cxn modelId="{5BBBD0A9-97DA-480E-AD44-1947C76CE5E6}" srcId="{CADE50C9-6A62-45AC-AF42-A90DC46A3209}" destId="{5F712884-449D-4DB5-9953-28B7C76B95EA}" srcOrd="0" destOrd="0" parTransId="{959B81DB-0329-4043-A334-D05EB5160B66}" sibTransId="{EB5FE175-6B6D-4195-A86F-6DFA96778160}"/>
+    <dgm:cxn modelId="{5BDE1DA6-E08E-43FF-BCA1-46EC3454F22A}" type="presOf" srcId="{5F712884-449D-4DB5-9953-28B7C76B95EA}" destId="{EF3A946E-96B3-4628-91EB-8B0A2A37DDB1}" srcOrd="0" destOrd="0" presId="urn:microsoft.com/office/officeart/2005/8/layout/process3"/>
     <dgm:cxn modelId="{9197A1EF-40BA-4A00-90BC-61CBC94FE8A7}" type="presOf" srcId="{3C06DC45-D510-48CC-B9DC-C19564791119}" destId="{9AFA4903-C1AC-4872-B8FC-33B461DA35FC}" srcOrd="0" destOrd="0" presId="urn:microsoft.com/office/officeart/2005/8/layout/process3"/>
     <dgm:cxn modelId="{63D5015B-3865-4A4B-AEB1-FBEF0DE71B9A}" srcId="{CADE50C9-6A62-45AC-AF42-A90DC46A3209}" destId="{DC2DF88C-35A0-4E30-A3E4-E002DC34F521}" srcOrd="2" destOrd="0" parTransId="{9BB88C43-2261-4EC7-A70D-463964685938}" sibTransId="{4DFC88DE-E0F0-4976-9B83-58EADA7CE300}"/>
-    <dgm:cxn modelId="{654B2758-BB63-4A67-9FA8-BFB78F357825}" type="presOf" srcId="{DC2DF88C-35A0-4E30-A3E4-E002DC34F521}" destId="{D297B747-A2CF-41E4-A59D-391BC474F135}" srcOrd="0" destOrd="0" presId="urn:microsoft.com/office/officeart/2005/8/layout/process3"/>
-    <dgm:cxn modelId="{C0883AEA-830B-4AD2-96BF-9E39D8362AB2}" type="presOf" srcId="{DC2DF88C-35A0-4E30-A3E4-E002DC34F521}" destId="{ABF185BD-956E-4777-8763-980278E426BB}" srcOrd="1" destOrd="0" presId="urn:microsoft.com/office/officeart/2005/8/layout/process3"/>
-    <dgm:cxn modelId="{B2733D3B-E352-4F5C-889A-1B9ECD5F8F60}" type="presOf" srcId="{EB5FE175-6B6D-4195-A86F-6DFA96778160}" destId="{B4B2D37A-6F50-4E0F-B305-9EB4D512D773}" srcOrd="0" destOrd="0" presId="urn:microsoft.com/office/officeart/2005/8/layout/process3"/>
-    <dgm:cxn modelId="{5BDE1DA6-E08E-43FF-BCA1-46EC3454F22A}" type="presOf" srcId="{5F712884-449D-4DB5-9953-28B7C76B95EA}" destId="{EF3A946E-96B3-4628-91EB-8B0A2A37DDB1}" srcOrd="0" destOrd="0" presId="urn:microsoft.com/office/officeart/2005/8/layout/process3"/>
-    <dgm:cxn modelId="{7C7C1ACA-D121-4A09-BFF4-2A57A30D871A}" type="presOf" srcId="{D7467A3A-2B78-4CDD-91C9-D96452997227}" destId="{84DC82A2-8D59-472B-BE22-46F053C16CD5}" srcOrd="0" destOrd="0" presId="urn:microsoft.com/office/officeart/2005/8/layout/process3"/>
-    <dgm:cxn modelId="{D998B319-C072-4BF0-B5CB-2075DB30B691}" srcId="{DC2DF88C-35A0-4E30-A3E4-E002DC34F521}" destId="{DF9FD532-8B13-446E-B6A3-59BDF574BCA8}" srcOrd="0" destOrd="0" parTransId="{3A79FA23-5F3F-4F7D-B4AC-A9C282166E18}" sibTransId="{31B32A6E-6E91-4EAA-96F6-92A0035B120A}"/>
-    <dgm:cxn modelId="{AABA8D8C-E800-4FDC-8C5F-A5D82041D563}" type="presOf" srcId="{CF1FE966-0BB0-47ED-84B3-EC7AB055925F}" destId="{032BAEB6-0FB1-4780-AF60-2EFB8C965C77}" srcOrd="0" destOrd="0" presId="urn:microsoft.com/office/officeart/2005/8/layout/process3"/>
-    <dgm:cxn modelId="{D95BF8C4-EEA0-4AAE-8693-AFAC7500B286}" srcId="{CADE50C9-6A62-45AC-AF42-A90DC46A3209}" destId="{981C2CD8-7E8A-4682-8B5A-A510268B34AC}" srcOrd="1" destOrd="0" parTransId="{1185AE54-EDEE-4D55-93F6-F7D354ED7C11}" sibTransId="{D7467A3A-2B78-4CDD-91C9-D96452997227}"/>
-    <dgm:cxn modelId="{5BBBD0A9-97DA-480E-AD44-1947C76CE5E6}" srcId="{CADE50C9-6A62-45AC-AF42-A90DC46A3209}" destId="{5F712884-449D-4DB5-9953-28B7C76B95EA}" srcOrd="0" destOrd="0" parTransId="{959B81DB-0329-4043-A334-D05EB5160B66}" sibTransId="{EB5FE175-6B6D-4195-A86F-6DFA96778160}"/>
-    <dgm:cxn modelId="{2A4D48E1-6639-4AC8-ABBF-C8A0D045AFB7}" srcId="{F5961DD5-682B-4D21-A827-30C64679BB5F}" destId="{72DB7378-4256-4528-8672-DEEF82828E57}" srcOrd="0" destOrd="0" parTransId="{97CEFC59-E261-4652-BC13-D71B45B5EC50}" sibTransId="{D0054105-F7A3-4CAE-89E2-0979360A932C}"/>
-    <dgm:cxn modelId="{7A81218D-5146-40F9-9731-5BD21503537E}" srcId="{981C2CD8-7E8A-4682-8B5A-A510268B34AC}" destId="{CF1FE966-0BB0-47ED-84B3-EC7AB055925F}" srcOrd="0" destOrd="0" parTransId="{FB956851-3BB2-4FF1-A9D6-4692FA0EFDCA}" sibTransId="{831C3CE2-0F23-433C-85CA-9D194AAC5E20}"/>
-    <dgm:cxn modelId="{6C7842C7-2928-4666-A7BA-454C6506C36C}" type="presOf" srcId="{4DFC88DE-E0F0-4976-9B83-58EADA7CE300}" destId="{7E8F3DD0-4BD8-4C40-B882-1E8B5E423D90}" srcOrd="1" destOrd="0" presId="urn:microsoft.com/office/officeart/2005/8/layout/process3"/>
-    <dgm:cxn modelId="{55246683-0A80-455D-B6B5-2B2736293CF2}" srcId="{5F712884-449D-4DB5-9953-28B7C76B95EA}" destId="{3C06DC45-D510-48CC-B9DC-C19564791119}" srcOrd="0" destOrd="0" parTransId="{65F5C7C6-EB25-442A-AB0B-B47F97609474}" sibTransId="{D1AB7263-DC38-4830-9C45-C1403EA8E20B}"/>
-    <dgm:cxn modelId="{461E3B8D-CDD4-4E38-A9CC-325E95F35F5C}" type="presOf" srcId="{72DB7378-4256-4528-8672-DEEF82828E57}" destId="{893E387F-15C0-4F86-BCD4-13F52E420B46}" srcOrd="0" destOrd="0" presId="urn:microsoft.com/office/officeart/2005/8/layout/process3"/>
-    <dgm:cxn modelId="{7A63044C-EE1D-4724-9059-4496B4425527}" type="presOf" srcId="{F5961DD5-682B-4D21-A827-30C64679BB5F}" destId="{4858D85A-2D02-42C7-A50A-A4E78D4F073F}" srcOrd="0" destOrd="0" presId="urn:microsoft.com/office/officeart/2005/8/layout/process3"/>
+    <dgm:cxn modelId="{73708078-FDBA-43F4-96AB-FB14C4C2602F}" srcId="{CADE50C9-6A62-45AC-AF42-A90DC46A3209}" destId="{F5961DD5-682B-4D21-A827-30C64679BB5F}" srcOrd="3" destOrd="0" parTransId="{75D73089-01C8-4BC0-90ED-CA9D1B8E3ADF}" sibTransId="{CA7ED3B0-10D1-4E2F-8BA0-8D58C22A94D0}"/>
     <dgm:cxn modelId="{BB6865B8-A688-4FC4-AFAA-E66324174F02}" type="presOf" srcId="{5F712884-449D-4DB5-9953-28B7C76B95EA}" destId="{E252839F-D941-4E3B-BA68-AC653DAEAE4C}" srcOrd="1" destOrd="0" presId="urn:microsoft.com/office/officeart/2005/8/layout/process3"/>
-    <dgm:cxn modelId="{73708078-FDBA-43F4-96AB-FB14C4C2602F}" srcId="{CADE50C9-6A62-45AC-AF42-A90DC46A3209}" destId="{F5961DD5-682B-4D21-A827-30C64679BB5F}" srcOrd="3" destOrd="0" parTransId="{75D73089-01C8-4BC0-90ED-CA9D1B8E3ADF}" sibTransId="{CA7ED3B0-10D1-4E2F-8BA0-8D58C22A94D0}"/>
-    <dgm:cxn modelId="{37CFE086-8264-4424-B1D0-18A97A56AF66}" type="presOf" srcId="{4DFC88DE-E0F0-4976-9B83-58EADA7CE300}" destId="{14AD0DAF-92D3-400A-A4E0-170D0AF84100}" srcOrd="0" destOrd="0" presId="urn:microsoft.com/office/officeart/2005/8/layout/process3"/>
-    <dgm:cxn modelId="{A5C9FCE5-8766-426B-B5BE-B83931DD52CA}" type="presOf" srcId="{D7467A3A-2B78-4CDD-91C9-D96452997227}" destId="{E38B4FCE-9678-4085-AB99-40595BD6EB1C}" srcOrd="1" destOrd="0" presId="urn:microsoft.com/office/officeart/2005/8/layout/process3"/>
-    <dgm:cxn modelId="{3F4BEE9E-8D26-4AD2-ADA0-D76B4E28C08E}" type="presOf" srcId="{981C2CD8-7E8A-4682-8B5A-A510268B34AC}" destId="{C084451C-3DBC-48CF-A871-B521FE90830A}" srcOrd="0" destOrd="0" presId="urn:microsoft.com/office/officeart/2005/8/layout/process3"/>
-    <dgm:cxn modelId="{47BAA679-3D6E-4A1A-91AA-9E404EE6A4CB}" type="presOf" srcId="{F5961DD5-682B-4D21-A827-30C64679BB5F}" destId="{D685B160-AC57-41A0-95FE-636A4391B913}" srcOrd="1" destOrd="0" presId="urn:microsoft.com/office/officeart/2005/8/layout/process3"/>
     <dgm:cxn modelId="{AF250757-46ED-49A3-A2B4-276D1B47F666}" type="presOf" srcId="{CADE50C9-6A62-45AC-AF42-A90DC46A3209}" destId="{FDB6D5C0-0ED5-4B9D-9E48-126ED2C433C3}" srcOrd="0" destOrd="0" presId="urn:microsoft.com/office/officeart/2005/8/layout/process3"/>
-    <dgm:cxn modelId="{762AB07F-C728-41D8-9B57-DB011D1EC3F0}" type="presOf" srcId="{DF9FD532-8B13-446E-B6A3-59BDF574BCA8}" destId="{1526152F-906E-4121-A143-DD130A011105}" srcOrd="0" destOrd="0" presId="urn:microsoft.com/office/officeart/2005/8/layout/process3"/>
     <dgm:cxn modelId="{2B1E6CD2-9E99-4BF4-91F4-6569897959CC}" type="presParOf" srcId="{FDB6D5C0-0ED5-4B9D-9E48-126ED2C433C3}" destId="{CFDB6B04-AAD5-42A2-8A40-C0EC4077F01E}" srcOrd="0" destOrd="0" presId="urn:microsoft.com/office/officeart/2005/8/layout/process3"/>
     <dgm:cxn modelId="{1E36B744-698A-4110-8366-45A5C14FAB2F}" type="presParOf" srcId="{CFDB6B04-AAD5-42A2-8A40-C0EC4077F01E}" destId="{EF3A946E-96B3-4628-91EB-8B0A2A37DDB1}" srcOrd="0" destOrd="0" presId="urn:microsoft.com/office/officeart/2005/8/layout/process3"/>
     <dgm:cxn modelId="{A8E72DFA-2E76-423D-B051-4B4AE1F43988}" type="presParOf" srcId="{CFDB6B04-AAD5-42A2-8A40-C0EC4077F01E}" destId="{E252839F-D941-4E3B-BA68-AC653DAEAE4C}" srcOrd="1" destOrd="0" presId="urn:microsoft.com/office/officeart/2005/8/layout/process3"/>
@@ -11527,7 +11527,7 @@
           <a:p>
             <a:fld id="{34475077-A074-4E8C-B45E-964494945228}" type="datetimeFigureOut">
               <a:rPr lang="en-US"/>
-              <a:t>5/22/2017</a:t>
+              <a:t>5/29/2017</a:t>
             </a:fld>
             <a:endParaRPr/>
           </a:p>
@@ -11692,7 +11692,7 @@
           <a:p>
             <a:fld id="{6A2B48A4-4B96-49F4-8C25-4C9D06114B2C}" type="datetimeFigureOut">
               <a:rPr lang="en-US"/>
-              <a:t>5/22/2017</a:t>
+              <a:t>5/29/2017</a:t>
             </a:fld>
             <a:endParaRPr/>
           </a:p>
@@ -12788,7 +12788,7 @@
           <a:p>
             <a:fld id="{5D81F1E7-4EFD-4BFF-B438-FCD52FD36B17}" type="slidenum">
               <a:rPr lang="en-US" smtClean="0"/>
-              <a:t>18</a:t>
+              <a:t>20</a:t>
             </a:fld>
             <a:endParaRPr lang="en-US"/>
           </a:p>
@@ -12897,7 +12897,7 @@
           <a:p>
             <a:fld id="{5D81F1E7-4EFD-4BFF-B438-FCD52FD36B17}" type="slidenum">
               <a:rPr lang="en-US" smtClean="0"/>
-              <a:t>20</a:t>
+              <a:t>22</a:t>
             </a:fld>
             <a:endParaRPr lang="en-US"/>
           </a:p>
@@ -13009,7 +13009,7 @@
           <a:p>
             <a:fld id="{5D81F1E7-4EFD-4BFF-B438-FCD52FD36B17}" type="slidenum">
               <a:rPr lang="en-US" smtClean="0"/>
-              <a:t>21</a:t>
+              <a:t>23</a:t>
             </a:fld>
             <a:endParaRPr lang="en-US"/>
           </a:p>
@@ -13121,7 +13121,7 @@
           <a:p>
             <a:fld id="{5D81F1E7-4EFD-4BFF-B438-FCD52FD36B17}" type="slidenum">
               <a:rPr lang="en-US" smtClean="0"/>
-              <a:t>22</a:t>
+              <a:t>24</a:t>
             </a:fld>
             <a:endParaRPr lang="en-US"/>
           </a:p>
@@ -13331,7 +13331,7 @@
           <a:p>
             <a:fld id="{5D81F1E7-4EFD-4BFF-B438-FCD52FD36B17}" type="slidenum">
               <a:rPr lang="en-US" smtClean="0"/>
-              <a:t>25</a:t>
+              <a:t>26</a:t>
             </a:fld>
             <a:endParaRPr lang="en-US"/>
           </a:p>
@@ -14545,7 +14545,7 @@
           <a:p>
             <a:fld id="{0402902D-A5F5-4D7D-AAA7-32469BA0BC4D}" type="datetimeFigureOut">
               <a:rPr lang="en-US"/>
-              <a:t>5/22/2017</a:t>
+              <a:t>5/29/2017</a:t>
             </a:fld>
             <a:endParaRPr/>
           </a:p>
@@ -14816,7 +14816,7 @@
           <a:p>
             <a:fld id="{0402902D-A5F5-4D7D-AAA7-32469BA0BC4D}" type="datetimeFigureOut">
               <a:rPr lang="en-US"/>
-              <a:t>5/22/2017</a:t>
+              <a:t>5/29/2017</a:t>
             </a:fld>
             <a:endParaRPr/>
           </a:p>
@@ -14976,7 +14976,7 @@
           <a:p>
             <a:fld id="{5214513F-8358-40C8-8827-E3DCE5F02ECA}" type="datetimeFigureOut">
               <a:rPr lang="en-US" smtClean="0"/>
-              <a:t>5/22/2017</a:t>
+              <a:t>5/29/2017</a:t>
             </a:fld>
             <a:endParaRPr lang="en-US"/>
           </a:p>
@@ -15144,7 +15144,7 @@
           <a:p>
             <a:fld id="{5214513F-8358-40C8-8827-E3DCE5F02ECA}" type="datetimeFigureOut">
               <a:rPr lang="en-US" smtClean="0"/>
-              <a:t>5/22/2017</a:t>
+              <a:t>5/29/2017</a:t>
             </a:fld>
             <a:endParaRPr lang="en-US"/>
           </a:p>
@@ -15389,7 +15389,7 @@
           <a:p>
             <a:fld id="{5214513F-8358-40C8-8827-E3DCE5F02ECA}" type="datetimeFigureOut">
               <a:rPr lang="en-US" smtClean="0"/>
-              <a:t>5/22/2017</a:t>
+              <a:t>5/29/2017</a:t>
             </a:fld>
             <a:endParaRPr lang="en-US"/>
           </a:p>
@@ -15618,7 +15618,7 @@
           <a:p>
             <a:fld id="{5214513F-8358-40C8-8827-E3DCE5F02ECA}" type="datetimeFigureOut">
               <a:rPr lang="en-US" smtClean="0"/>
-              <a:t>5/22/2017</a:t>
+              <a:t>5/29/2017</a:t>
             </a:fld>
             <a:endParaRPr lang="en-US"/>
           </a:p>
@@ -15982,7 +15982,7 @@
           <a:p>
             <a:fld id="{5214513F-8358-40C8-8827-E3DCE5F02ECA}" type="datetimeFigureOut">
               <a:rPr lang="en-US" smtClean="0"/>
-              <a:t>5/22/2017</a:t>
+              <a:t>5/29/2017</a:t>
             </a:fld>
             <a:endParaRPr lang="en-US"/>
           </a:p>
@@ -16099,7 +16099,7 @@
           <a:p>
             <a:fld id="{5214513F-8358-40C8-8827-E3DCE5F02ECA}" type="datetimeFigureOut">
               <a:rPr lang="en-US" smtClean="0"/>
-              <a:t>5/22/2017</a:t>
+              <a:t>5/29/2017</a:t>
             </a:fld>
             <a:endParaRPr lang="en-US"/>
           </a:p>
@@ -16194,7 +16194,7 @@
           <a:p>
             <a:fld id="{5214513F-8358-40C8-8827-E3DCE5F02ECA}" type="datetimeFigureOut">
               <a:rPr lang="en-US" smtClean="0"/>
-              <a:t>5/22/2017</a:t>
+              <a:t>5/29/2017</a:t>
             </a:fld>
             <a:endParaRPr lang="en-US"/>
           </a:p>
@@ -16469,7 +16469,7 @@
           <a:p>
             <a:fld id="{5214513F-8358-40C8-8827-E3DCE5F02ECA}" type="datetimeFigureOut">
               <a:rPr lang="en-US" smtClean="0"/>
-              <a:t>5/22/2017</a:t>
+              <a:t>5/29/2017</a:t>
             </a:fld>
             <a:endParaRPr lang="en-US"/>
           </a:p>
@@ -16681,7 +16681,7 @@
           <a:p>
             <a:fld id="{0402902D-A5F5-4D7D-AAA7-32469BA0BC4D}" type="datetimeFigureOut">
               <a:rPr lang="en-US"/>
-              <a:t>5/22/2017</a:t>
+              <a:t>5/29/2017</a:t>
             </a:fld>
             <a:endParaRPr/>
           </a:p>
@@ -16903,7 +16903,7 @@
           <a:p>
             <a:fld id="{5214513F-8358-40C8-8827-E3DCE5F02ECA}" type="datetimeFigureOut">
               <a:rPr lang="en-US" smtClean="0"/>
-              <a:t>5/22/2017</a:t>
+              <a:t>5/29/2017</a:t>
             </a:fld>
             <a:endParaRPr lang="en-US"/>
           </a:p>
@@ -17071,7 +17071,7 @@
           <a:p>
             <a:fld id="{5214513F-8358-40C8-8827-E3DCE5F02ECA}" type="datetimeFigureOut">
               <a:rPr lang="en-US" smtClean="0"/>
-              <a:t>5/22/2017</a:t>
+              <a:t>5/29/2017</a:t>
             </a:fld>
             <a:endParaRPr lang="en-US"/>
           </a:p>
@@ -17249,7 +17249,7 @@
           <a:p>
             <a:fld id="{5214513F-8358-40C8-8827-E3DCE5F02ECA}" type="datetimeFigureOut">
               <a:rPr lang="en-US" smtClean="0"/>
-              <a:t>5/22/2017</a:t>
+              <a:t>5/29/2017</a:t>
             </a:fld>
             <a:endParaRPr lang="en-US"/>
           </a:p>
@@ -17866,7 +17866,7 @@
           <a:p>
             <a:fld id="{0402902D-A5F5-4D7D-AAA7-32469BA0BC4D}" type="datetimeFigureOut">
               <a:rPr lang="en-US"/>
-              <a:t>5/22/2017</a:t>
+              <a:t>5/29/2017</a:t>
             </a:fld>
             <a:endParaRPr/>
           </a:p>
@@ -18314,7 +18314,7 @@
           <a:p>
             <a:fld id="{0402902D-A5F5-4D7D-AAA7-32469BA0BC4D}" type="datetimeFigureOut">
               <a:rPr lang="en-US"/>
-              <a:t>5/22/2017</a:t>
+              <a:t>5/29/2017</a:t>
             </a:fld>
             <a:endParaRPr/>
           </a:p>
@@ -18444,7 +18444,7 @@
           <a:p>
             <a:fld id="{0402902D-A5F5-4D7D-AAA7-32469BA0BC4D}" type="datetimeFigureOut">
               <a:rPr lang="en-US"/>
-              <a:t>5/22/2017</a:t>
+              <a:t>5/29/2017</a:t>
             </a:fld>
             <a:endParaRPr/>
           </a:p>
@@ -18551,7 +18551,7 @@
           <a:p>
             <a:fld id="{0402902D-A5F5-4D7D-AAA7-32469BA0BC4D}" type="datetimeFigureOut">
               <a:rPr lang="en-US"/>
-              <a:t>5/22/2017</a:t>
+              <a:t>5/29/2017</a:t>
             </a:fld>
             <a:endParaRPr dirty="0"/>
           </a:p>
@@ -19523,7 +19523,7 @@
             <a:fld id="{0402902D-A5F5-4D7D-AAA7-32469BA0BC4D}" type="datetimeFigureOut">
               <a:rPr lang="en-US"/>
               <a:pPr/>
-              <a:t>5/22/2017</a:t>
+              <a:t>5/29/2017</a:t>
             </a:fld>
             <a:endParaRPr dirty="0"/>
           </a:p>
@@ -20029,7 +20029,7 @@
           <a:p>
             <a:fld id="{5214513F-8358-40C8-8827-E3DCE5F02ECA}" type="datetimeFigureOut">
               <a:rPr lang="en-US" smtClean="0"/>
-              <a:t>5/22/2017</a:t>
+              <a:t>5/29/2017</a:t>
             </a:fld>
             <a:endParaRPr lang="en-US"/>
           </a:p>
@@ -20889,7 +20889,7 @@
           <a:p>
             <a:r>
               <a:rPr lang="en-US" dirty="0"/>
-              <a:t>Alcohol Consumption and Final Grades</a:t>
+              <a:t>Weekly Alcohol Consumption and Final Grades</a:t>
             </a:r>
           </a:p>
         </p:txBody>
@@ -20923,6 +20923,44 @@
           </a:xfrm>
         </p:spPr>
       </p:pic>
+      <p:sp>
+        <p:nvSpPr>
+          <p:cNvPr id="3" name="TextBox 2"/>
+          <p:cNvSpPr txBox="1"/>
+          <p:nvPr/>
+        </p:nvSpPr>
+        <p:spPr>
+          <a:xfrm>
+            <a:off x="644577" y="2630774"/>
+            <a:ext cx="5448925" cy="1200329"/>
+          </a:xfrm>
+          <a:prstGeom prst="rect">
+            <a:avLst/>
+          </a:prstGeom>
+          <a:noFill/>
+        </p:spPr>
+        <p:txBody>
+          <a:bodyPr wrap="square" rtlCol="0">
+            <a:spAutoFit/>
+          </a:bodyPr>
+          <a:lstStyle/>
+          <a:p>
+            <a:r>
+              <a:rPr lang="en-GB" dirty="0"/>
+              <a:t>Median spread of grades are even across the alcohol consumption levels but fall slightly </a:t>
+            </a:r>
+            <a:r>
+              <a:rPr lang="en-GB" dirty="0" err="1"/>
+              <a:t>fror</a:t>
+            </a:r>
+            <a:r>
+              <a:rPr lang="en-GB" dirty="0"/>
+              <a:t> levels 4 and 5 while the spread of grades across students is smaller for alcohol levels 4 and 5.</a:t>
+            </a:r>
+            <a:endParaRPr lang="en-US" dirty="0"/>
+          </a:p>
+        </p:txBody>
+      </p:sp>
     </p:spTree>
     <p:extLst>
       <p:ext uri="{BB962C8B-B14F-4D97-AF65-F5344CB8AC3E}">
@@ -21050,7 +21088,7 @@
       </p:sp>
       <p:pic>
         <p:nvPicPr>
-          <p:cNvPr id="5" name="Picture 4"/>
+          <p:cNvPr id="4" name="Picture 3"/>
           <p:cNvPicPr>
             <a:picLocks noChangeAspect="1"/>
           </p:cNvPicPr>
@@ -21064,8 +21102,8 @@
         </p:blipFill>
         <p:spPr>
           <a:xfrm>
-            <a:off x="6220918" y="1875564"/>
-            <a:ext cx="5358749" cy="2871007"/>
+            <a:off x="6075079" y="1783829"/>
+            <a:ext cx="5994813" cy="1349661"/>
           </a:xfrm>
           <a:prstGeom prst="rect">
             <a:avLst/>
@@ -21131,12 +21169,14 @@
           </a:xfrm>
         </p:spPr>
         <p:txBody>
-          <a:bodyPr/>
+          <a:bodyPr>
+            <a:normAutofit/>
+          </a:bodyPr>
           <a:lstStyle/>
           <a:p>
             <a:r>
-              <a:rPr lang="en-US" dirty="0"/>
-              <a:t>Add your answer / solution here</a:t>
+              <a:rPr lang="en-US" sz="4000" dirty="0"/>
+              <a:t>As age increases, the pass rate lowers especially from age 17</a:t>
             </a:r>
           </a:p>
         </p:txBody>
@@ -21162,13 +21202,8 @@
                   <a:schemeClr val="tx1"/>
                 </a:solidFill>
               </a:rPr>
-              <a:t>Pass Rate lowest for older Students</a:t>
-            </a:r>
-            <a:endParaRPr lang="en-US" dirty="0">
-              <a:solidFill>
-                <a:schemeClr val="tx1"/>
-              </a:solidFill>
-            </a:endParaRPr>
+              <a:t>Does Age influence the Pass rate?</a:t>
+            </a:r>
           </a:p>
         </p:txBody>
       </p:sp>
@@ -21261,12 +21296,21 @@
           </a:xfrm>
         </p:spPr>
         <p:txBody>
-          <a:bodyPr/>
+          <a:bodyPr>
+            <a:normAutofit/>
+          </a:bodyPr>
           <a:lstStyle/>
           <a:p>
             <a:r>
-              <a:rPr lang="en-US" dirty="0"/>
-              <a:t>Add your answer / solution here</a:t>
+              <a:rPr lang="en-US" sz="4000" dirty="0"/>
+              <a:t>The pass rate fails from daily consumption levels 4. </a:t>
+            </a:r>
+            <a:br>
+              <a:rPr lang="en-US" sz="4000" dirty="0"/>
+            </a:br>
+            <a:r>
+              <a:rPr lang="en-US" sz="4000" dirty="0"/>
+              <a:t>Most alcohol drinkers are in Category 1 </a:t>
             </a:r>
           </a:p>
         </p:txBody>
@@ -21292,13 +21336,8 @@
                   <a:schemeClr val="tx1"/>
                 </a:solidFill>
               </a:rPr>
-              <a:t>Increased Daily alcohol consumption reduces Pass rate</a:t>
-            </a:r>
-            <a:endParaRPr lang="en-US" dirty="0">
-              <a:solidFill>
-                <a:schemeClr val="tx1"/>
-              </a:solidFill>
-            </a:endParaRPr>
+              <a:t>How does Daily consumption affect students passing rates?</a:t>
+            </a:r>
           </a:p>
         </p:txBody>
       </p:sp>
@@ -21391,12 +21430,14 @@
           </a:xfrm>
         </p:spPr>
         <p:txBody>
-          <a:bodyPr/>
+          <a:bodyPr>
+            <a:noAutofit/>
+          </a:bodyPr>
           <a:lstStyle/>
           <a:p>
             <a:r>
-              <a:rPr lang="en-US" dirty="0"/>
-              <a:t>Add your answer / solution here</a:t>
+              <a:rPr lang="en-US" sz="4000" dirty="0"/>
+              <a:t>Travel time has a clear impact on Pass rate which fall with longer journeys. This could mean the students are not getting enough study time.</a:t>
             </a:r>
           </a:p>
         </p:txBody>
@@ -21422,13 +21463,8 @@
                   <a:schemeClr val="tx1"/>
                 </a:solidFill>
               </a:rPr>
-              <a:t>Increased travel time reduces Pass Rate</a:t>
-            </a:r>
-            <a:endParaRPr lang="en-US" dirty="0">
-              <a:solidFill>
-                <a:schemeClr val="tx1"/>
-              </a:solidFill>
-            </a:endParaRPr>
+              <a:t>Does taking more time getting to school affect grades?</a:t>
+            </a:r>
           </a:p>
         </p:txBody>
       </p:sp>
@@ -21608,7 +21644,7 @@
         <p:spPr>
           <a:xfrm>
             <a:off x="1236689" y="3920008"/>
-            <a:ext cx="8004747" cy="2308324"/>
+            <a:ext cx="8004747" cy="2862322"/>
           </a:xfrm>
           <a:prstGeom prst="rect">
             <a:avLst/>
@@ -21643,14 +21679,41 @@
             </a:r>
             <a:r>
               <a:rPr lang="en-US" dirty="0"/>
-              <a:t>", number=10, repeats=3) </a:t>
-            </a:r>
-          </a:p>
-          <a:p>
+              <a:t>", number=10, repeats=3, </a:t>
+            </a:r>
+            <a:r>
+              <a:rPr lang="en-US" dirty="0" err="1"/>
+              <a:t>summaryFunction</a:t>
+            </a:r>
             <a:r>
               <a:rPr lang="en-US" dirty="0"/>
-              <a:t>metric &lt;- "Accuracy"</a:t>
-            </a:r>
+              <a:t>=</a:t>
+            </a:r>
+            <a:r>
+              <a:rPr lang="en-US" dirty="0" err="1"/>
+              <a:t>twoClassSummary</a:t>
+            </a:r>
+            <a:r>
+              <a:rPr lang="en-US" dirty="0"/>
+              <a:t>, </a:t>
+            </a:r>
+            <a:r>
+              <a:rPr lang="en-US" dirty="0" err="1"/>
+              <a:t>classProbs</a:t>
+            </a:r>
+            <a:r>
+              <a:rPr lang="en-US" dirty="0"/>
+              <a:t> = TRUE) </a:t>
+            </a:r>
+          </a:p>
+          <a:p>
+            <a:r>
+              <a:rPr lang="en-US" dirty="0"/>
+              <a:t>metric &lt;- "ROC"</a:t>
+            </a:r>
+          </a:p>
+          <a:p>
+            <a:endParaRPr lang="en-US" dirty="0"/>
           </a:p>
           <a:p>
             <a:endParaRPr lang="en-US" dirty="0"/>
@@ -21818,30 +21881,6 @@
           </a:p>
         </p:txBody>
       </p:sp>
-      <p:pic>
-        <p:nvPicPr>
-          <p:cNvPr id="9" name="Picture 8"/>
-          <p:cNvPicPr>
-            <a:picLocks noChangeAspect="1"/>
-          </p:cNvPicPr>
-          <p:nvPr/>
-        </p:nvPicPr>
-        <p:blipFill>
-          <a:blip r:embed="rId3"/>
-          <a:stretch>
-            <a:fillRect/>
-          </a:stretch>
-        </p:blipFill>
-        <p:spPr>
-          <a:xfrm>
-            <a:off x="5344255" y="1626433"/>
-            <a:ext cx="6490480" cy="4265716"/>
-          </a:xfrm>
-          <a:prstGeom prst="rect">
-            <a:avLst/>
-          </a:prstGeom>
-        </p:spPr>
-      </p:pic>
       <p:sp>
         <p:nvSpPr>
           <p:cNvPr id="3" name="TextBox 2"/>
@@ -21875,12 +21914,36 @@
           <a:p>
             <a:r>
               <a:rPr lang="en-GB" dirty="0"/>
-              <a:t>Accuracy of GLMNET was the highest.</a:t>
+              <a:t>GBM had the highest accuracy of 0.7399</a:t>
             </a:r>
             <a:endParaRPr lang="en-US" dirty="0"/>
           </a:p>
         </p:txBody>
       </p:sp>
+      <p:pic>
+        <p:nvPicPr>
+          <p:cNvPr id="5" name="Picture 4"/>
+          <p:cNvPicPr>
+            <a:picLocks noChangeAspect="1"/>
+          </p:cNvPicPr>
+          <p:nvPr/>
+        </p:nvPicPr>
+        <p:blipFill>
+          <a:blip r:embed="rId3"/>
+          <a:stretch>
+            <a:fillRect/>
+          </a:stretch>
+        </p:blipFill>
+        <p:spPr>
+          <a:xfrm>
+            <a:off x="4762186" y="1655023"/>
+            <a:ext cx="7373756" cy="3374973"/>
+          </a:xfrm>
+          <a:prstGeom prst="rect">
+            <a:avLst/>
+          </a:prstGeom>
+        </p:spPr>
+      </p:pic>
     </p:spTree>
     <p:extLst>
       <p:ext uri="{BB962C8B-B14F-4D97-AF65-F5344CB8AC3E}">
@@ -21940,7 +22003,7 @@
           <a:p>
             <a:r>
               <a:rPr lang="en-GB" dirty="0"/>
-              <a:t>GLMNET Variable Importance (descending)</a:t>
+              <a:t>GBM Variable Importance (descending)</a:t>
             </a:r>
             <a:endParaRPr lang="en-US" dirty="0"/>
           </a:p>
@@ -21972,36 +22035,6 @@
           </a:p>
         </p:txBody>
       </p:sp>
-      <p:pic>
-        <p:nvPicPr>
-          <p:cNvPr id="8" name="Picture 7"/>
-          <p:cNvPicPr>
-            <a:picLocks noChangeAspect="1"/>
-          </p:cNvPicPr>
-          <p:nvPr/>
-        </p:nvPicPr>
-        <p:blipFill>
-          <a:blip r:embed="rId3">
-            <a:extLst>
-              <a:ext uri="{28A0092B-C50C-407E-A947-70E740481C1C}">
-                <a14:useLocalDpi xmlns:a14="http://schemas.microsoft.com/office/drawing/2010/main" val="0"/>
-              </a:ext>
-            </a:extLst>
-          </a:blip>
-          <a:stretch>
-            <a:fillRect/>
-          </a:stretch>
-        </p:blipFill>
-        <p:spPr>
-          <a:xfrm>
-            <a:off x="6344582" y="1491521"/>
-            <a:ext cx="5787457" cy="5194092"/>
-          </a:xfrm>
-          <a:prstGeom prst="rect">
-            <a:avLst/>
-          </a:prstGeom>
-        </p:spPr>
-      </p:pic>
       <p:sp>
         <p:nvSpPr>
           <p:cNvPr id="10" name="TextBox 9"/>
@@ -22040,7 +22073,7 @@
             </a:pPr>
             <a:r>
               <a:rPr lang="en-GB" sz="2400" dirty="0"/>
-              <a:t>Studytime30mins-1hour</a:t>
+              <a:t>absences</a:t>
             </a:r>
           </a:p>
           <a:p>
@@ -22050,7 +22083,7 @@
             </a:pPr>
             <a:r>
               <a:rPr lang="en-GB" sz="2400" dirty="0"/>
-              <a:t>FamilySizeLE3</a:t>
+              <a:t>age</a:t>
             </a:r>
           </a:p>
           <a:p>
@@ -22070,10 +22103,9 @@
               <a:buChar char="•"/>
             </a:pPr>
             <a:r>
-              <a:rPr lang="en-GB" sz="2400" dirty="0" err="1"/>
-              <a:t>Medu.Grade</a:t>
-            </a:r>
-            <a:endParaRPr lang="en-GB" sz="2400" dirty="0"/>
+              <a:rPr lang="en-GB" sz="2400" dirty="0"/>
+              <a:t>Traveltime.under15mins</a:t>
+            </a:r>
           </a:p>
           <a:p>
             <a:pPr marL="285750" indent="-285750">
@@ -22082,7 +22114,7 @@
             </a:pPr>
             <a:r>
               <a:rPr lang="en-GB" sz="2400" dirty="0" err="1"/>
-              <a:t>SchoolSup.Y</a:t>
+              <a:t>freetime</a:t>
             </a:r>
             <a:endParaRPr lang="en-GB" sz="2400" dirty="0"/>
           </a:p>
@@ -22092,9 +22124,10 @@
               <a:buChar char="•"/>
             </a:pPr>
             <a:r>
-              <a:rPr lang="en-GB" sz="2400" dirty="0"/>
-              <a:t>Goout.xx4</a:t>
-            </a:r>
+              <a:rPr lang="en-GB" sz="2400" dirty="0" err="1"/>
+              <a:t>romantic.Y</a:t>
+            </a:r>
+            <a:endParaRPr lang="en-GB" sz="2400" dirty="0"/>
           </a:p>
           <a:p>
             <a:pPr marL="285750" indent="-285750">
@@ -22103,12 +22136,42 @@
             </a:pPr>
             <a:r>
               <a:rPr lang="en-GB" sz="2400" dirty="0" err="1"/>
-              <a:t>Fedu.NoGrade</a:t>
+              <a:t>schoolsup.Y</a:t>
             </a:r>
             <a:endParaRPr lang="en-US" sz="2400" dirty="0"/>
           </a:p>
         </p:txBody>
       </p:sp>
+      <p:pic>
+        <p:nvPicPr>
+          <p:cNvPr id="3" name="Picture 2"/>
+          <p:cNvPicPr>
+            <a:picLocks noChangeAspect="1"/>
+          </p:cNvPicPr>
+          <p:nvPr/>
+        </p:nvPicPr>
+        <p:blipFill>
+          <a:blip r:embed="rId3">
+            <a:extLst>
+              <a:ext uri="{28A0092B-C50C-407E-A947-70E740481C1C}">
+                <a14:useLocalDpi xmlns:a14="http://schemas.microsoft.com/office/drawing/2010/main" val="0"/>
+              </a:ext>
+            </a:extLst>
+          </a:blip>
+          <a:stretch>
+            <a:fillRect/>
+          </a:stretch>
+        </p:blipFill>
+        <p:spPr>
+          <a:xfrm>
+            <a:off x="5546977" y="1678899"/>
+            <a:ext cx="6196062" cy="4879298"/>
+          </a:xfrm>
+          <a:prstGeom prst="rect">
+            <a:avLst/>
+          </a:prstGeom>
+        </p:spPr>
+      </p:pic>
     </p:spTree>
     <p:extLst>
       <p:ext uri="{BB962C8B-B14F-4D97-AF65-F5344CB8AC3E}">
@@ -22135,7 +22198,7 @@
 </file>
 
 <file path=ppt/slides/slide18.xml><?xml version="1.0" encoding="utf-8"?>
-<p:sld xmlns:a="http://schemas.openxmlformats.org/drawingml/2006/main" xmlns:r="http://schemas.openxmlformats.org/officeDocument/2006/relationships" xmlns:p="http://schemas.openxmlformats.org/presentationml/2006/main" show="0">
+<p:sld xmlns:a="http://schemas.openxmlformats.org/drawingml/2006/main" xmlns:r="http://schemas.openxmlformats.org/officeDocument/2006/relationships" xmlns:p="http://schemas.openxmlformats.org/presentationml/2006/main">
   <p:cSld>
     <p:spTree>
       <p:nvGrpSpPr>
@@ -22167,42 +22230,88 @@
           <a:lstStyle/>
           <a:p>
             <a:r>
-              <a:rPr lang="en-GB" dirty="0"/>
-              <a:t>Dummy Variables</a:t>
-            </a:r>
-            <a:endParaRPr lang="en-US" dirty="0"/>
+              <a:rPr lang="en-US" dirty="0"/>
+              <a:t>Conclusion</a:t>
+            </a:r>
           </a:p>
         </p:txBody>
       </p:sp>
-      <p:graphicFrame>
-        <p:nvGraphicFramePr>
-          <p:cNvPr id="4" name="Content Placeholder 2" descr="Accent process showing 4 groups arranged from left to right with task descriptions under each group"/>
-          <p:cNvGraphicFramePr>
-            <a:graphicFrameLocks noGrp="1"/>
-          </p:cNvGraphicFramePr>
+      <p:sp>
+        <p:nvSpPr>
+          <p:cNvPr id="3" name="Content Placeholder 2"/>
+          <p:cNvSpPr>
+            <a:spLocks noGrp="1"/>
+          </p:cNvSpPr>
           <p:nvPr>
             <p:ph idx="1"/>
-            <p:extLst>
-              <p:ext uri="{D42A27DB-BD31-4B8C-83A1-F6EECF244321}">
-                <p14:modId xmlns:p14="http://schemas.microsoft.com/office/powerpoint/2010/main" val="2607036372"/>
-              </p:ext>
-            </p:extLst>
           </p:nvPr>
-        </p:nvGraphicFramePr>
-        <p:xfrm>
-          <a:off x="1066800" y="1714500"/>
-          <a:ext cx="10058400" cy="4457700"/>
-        </p:xfrm>
-        <a:graphic>
-          <a:graphicData uri="http://schemas.openxmlformats.org/drawingml/2006/diagram">
-            <dgm:relIds xmlns:dgm="http://schemas.openxmlformats.org/drawingml/2006/diagram" xmlns:r="http://schemas.openxmlformats.org/officeDocument/2006/relationships" r:dm="rId3" r:lo="rId4" r:qs="rId5" r:cs="rId6"/>
-          </a:graphicData>
-        </a:graphic>
-      </p:graphicFrame>
+        </p:nvSpPr>
+        <p:spPr/>
+        <p:txBody>
+          <a:bodyPr/>
+          <a:lstStyle/>
+          <a:p>
+            <a:r>
+              <a:rPr lang="en-US" dirty="0"/>
+              <a:t>Alcohol consumption (weekly or daily) are not variables of importance in predicting school grades.</a:t>
+            </a:r>
+          </a:p>
+          <a:p>
+            <a:r>
+              <a:rPr lang="en-US" dirty="0"/>
+              <a:t>The most important variables based on exploratory analysis are;</a:t>
+            </a:r>
+          </a:p>
+          <a:p>
+            <a:pPr marL="0" indent="0">
+              <a:buNone/>
+            </a:pPr>
+            <a:r>
+              <a:rPr lang="en-GB" dirty="0"/>
+              <a:t>failure</a:t>
+            </a:r>
+            <a:br>
+              <a:rPr lang="en-GB" dirty="0"/>
+            </a:br>
+            <a:r>
+              <a:rPr lang="en-GB" dirty="0"/>
+              <a:t>absences</a:t>
+            </a:r>
+            <a:br>
+              <a:rPr lang="en-GB" dirty="0"/>
+            </a:br>
+            <a:r>
+              <a:rPr lang="en-GB" dirty="0" err="1"/>
+              <a:t>higher.Y</a:t>
+            </a:r>
+            <a:br>
+              <a:rPr lang="en-GB" dirty="0"/>
+            </a:br>
+            <a:r>
+              <a:rPr lang="en-GB" dirty="0"/>
+              <a:t>age</a:t>
+            </a:r>
+          </a:p>
+          <a:p>
+            <a:r>
+              <a:rPr lang="en-GB" dirty="0"/>
+              <a:t>After sampling 5 different algorithms, GBM was the </a:t>
+            </a:r>
+            <a:r>
+              <a:rPr lang="en-GB"/>
+              <a:t>best performing model. </a:t>
+            </a:r>
+            <a:endParaRPr lang="en-US" dirty="0"/>
+          </a:p>
+          <a:p>
+            <a:endParaRPr lang="en-US" dirty="0"/>
+          </a:p>
+        </p:txBody>
+      </p:sp>
     </p:spTree>
     <p:extLst>
       <p:ext uri="{BB962C8B-B14F-4D97-AF65-F5344CB8AC3E}">
-        <p14:creationId xmlns:p14="http://schemas.microsoft.com/office/powerpoint/2010/main" val="3341394575"/>
+        <p14:creationId xmlns:p14="http://schemas.microsoft.com/office/powerpoint/2010/main" val="2396544352"/>
       </p:ext>
     </p:extLst>
   </p:cSld>
@@ -22225,7 +22334,7 @@
 </file>
 
 <file path=ppt/slides/slide19.xml><?xml version="1.0" encoding="utf-8"?>
-<p:sld xmlns:a="http://schemas.openxmlformats.org/drawingml/2006/main" xmlns:r="http://schemas.openxmlformats.org/officeDocument/2006/relationships" xmlns:p="http://schemas.openxmlformats.org/presentationml/2006/main" show="0">
+<p:sld xmlns:a="http://schemas.openxmlformats.org/drawingml/2006/main" xmlns:r="http://schemas.openxmlformats.org/officeDocument/2006/relationships" xmlns:p="http://schemas.openxmlformats.org/presentationml/2006/main">
   <p:cSld>
     <p:spTree>
       <p:nvGrpSpPr>
@@ -22257,41 +22366,45 @@
           <a:lstStyle/>
           <a:p>
             <a:r>
-              <a:rPr lang="en-US" dirty="0"/>
-              <a:t>Variables</a:t>
-            </a:r>
+              <a:rPr lang="en-US"/>
+              <a:t>Works Cited</a:t>
+            </a:r>
+            <a:endParaRPr lang="en-US" dirty="0"/>
           </a:p>
         </p:txBody>
       </p:sp>
-      <p:graphicFrame>
-        <p:nvGraphicFramePr>
-          <p:cNvPr id="4" name="Content Placeholder 2" descr="Horizontal bullet list showing 3 groups arranged adjacent to one another and bullet points are present under each group"/>
-          <p:cNvGraphicFramePr>
-            <a:graphicFrameLocks noGrp="1"/>
-          </p:cNvGraphicFramePr>
+      <p:sp>
+        <p:nvSpPr>
+          <p:cNvPr id="3" name="Content Placeholder 2"/>
+          <p:cNvSpPr>
+            <a:spLocks noGrp="1"/>
+          </p:cNvSpPr>
           <p:nvPr>
             <p:ph idx="1"/>
-            <p:extLst>
-              <p:ext uri="{D42A27DB-BD31-4B8C-83A1-F6EECF244321}">
-                <p14:modId xmlns:p14="http://schemas.microsoft.com/office/powerpoint/2010/main" val="1513669856"/>
-              </p:ext>
-            </p:extLst>
           </p:nvPr>
-        </p:nvGraphicFramePr>
-        <p:xfrm>
-          <a:off x="1066800" y="1714500"/>
-          <a:ext cx="10058400" cy="4457700"/>
-        </p:xfrm>
-        <a:graphic>
-          <a:graphicData uri="http://schemas.openxmlformats.org/drawingml/2006/diagram">
-            <dgm:relIds xmlns:dgm="http://schemas.openxmlformats.org/drawingml/2006/diagram" xmlns:r="http://schemas.openxmlformats.org/officeDocument/2006/relationships" r:dm="rId2" r:lo="rId3" r:qs="rId4" r:cs="rId5"/>
-          </a:graphicData>
-        </a:graphic>
-      </p:graphicFrame>
+        </p:nvSpPr>
+        <p:spPr/>
+        <p:txBody>
+          <a:bodyPr/>
+          <a:lstStyle/>
+          <a:p>
+            <a:r>
+              <a:rPr lang="en-US" dirty="0"/>
+              <a:t>Include print and electronic sources in alphabetical order</a:t>
+            </a:r>
+          </a:p>
+          <a:p>
+            <a:r>
+              <a:rPr lang="en-US" dirty="0"/>
+              <a:t>http://archive.ics.uci.edu/ml/datasets/student+performance</a:t>
+            </a:r>
+          </a:p>
+        </p:txBody>
+      </p:sp>
     </p:spTree>
     <p:extLst>
       <p:ext uri="{BB962C8B-B14F-4D97-AF65-F5344CB8AC3E}">
-        <p14:creationId xmlns:p14="http://schemas.microsoft.com/office/powerpoint/2010/main" val="588768708"/>
+        <p14:creationId xmlns:p14="http://schemas.microsoft.com/office/powerpoint/2010/main" val="1074044145"/>
       </p:ext>
     </p:extLst>
   </p:cSld>
@@ -22354,7 +22467,7 @@
           <a:p>
             <a:r>
               <a:rPr lang="en-US" sz="2800" dirty="0"/>
-              <a:t>This data approach student achievement in secondary education of two Portuguese schools.</a:t>
+              <a:t>This data shows student achievement in secondary education of two Portuguese schools.</a:t>
             </a:r>
             <a:br>
               <a:rPr lang="en-US" sz="2800" dirty="0"/>
@@ -22450,7 +22563,7 @@
 </file>
 
 <file path=ppt/slides/slide20.xml><?xml version="1.0" encoding="utf-8"?>
-<p:sld xmlns:a="http://schemas.openxmlformats.org/drawingml/2006/main" xmlns:r="http://schemas.openxmlformats.org/officeDocument/2006/relationships" xmlns:p="http://schemas.openxmlformats.org/presentationml/2006/main">
+<p:sld xmlns:a="http://schemas.openxmlformats.org/drawingml/2006/main" xmlns:r="http://schemas.openxmlformats.org/officeDocument/2006/relationships" xmlns:p="http://schemas.openxmlformats.org/presentationml/2006/main" show="0">
   <p:cSld>
     <p:spTree>
       <p:nvGrpSpPr>
@@ -22482,42 +22595,42 @@
           <a:lstStyle/>
           <a:p>
             <a:r>
-              <a:rPr lang="en-US" dirty="0"/>
-              <a:t>Analysis</a:t>
-            </a:r>
+              <a:rPr lang="en-GB" dirty="0"/>
+              <a:t>Dummy Variables</a:t>
+            </a:r>
+            <a:endParaRPr lang="en-US" dirty="0"/>
           </a:p>
         </p:txBody>
       </p:sp>
-      <p:sp>
-        <p:nvSpPr>
-          <p:cNvPr id="3" name="Text Placeholder 2"/>
-          <p:cNvSpPr>
-            <a:spLocks noGrp="1"/>
-          </p:cNvSpPr>
+      <p:graphicFrame>
+        <p:nvGraphicFramePr>
+          <p:cNvPr id="4" name="Content Placeholder 2" descr="Accent process showing 4 groups arranged from left to right with task descriptions under each group"/>
+          <p:cNvGraphicFramePr>
+            <a:graphicFrameLocks noGrp="1"/>
+          </p:cNvGraphicFramePr>
           <p:nvPr>
-            <p:ph type="body" idx="1"/>
+            <p:ph idx="1"/>
+            <p:extLst>
+              <p:ext uri="{D42A27DB-BD31-4B8C-83A1-F6EECF244321}">
+                <p14:modId xmlns:p14="http://schemas.microsoft.com/office/powerpoint/2010/main" val="2607036372"/>
+              </p:ext>
+            </p:extLst>
           </p:nvPr>
-        </p:nvSpPr>
-        <p:spPr/>
-        <p:txBody>
-          <a:bodyPr/>
-          <a:lstStyle/>
-          <a:p>
-            <a:r>
-              <a:rPr lang="en-US" dirty="0">
-                <a:solidFill>
-                  <a:schemeClr val="tx1"/>
-                </a:solidFill>
-              </a:rPr>
-              <a:t>Hypothesis</a:t>
-            </a:r>
-          </a:p>
-        </p:txBody>
-      </p:sp>
+        </p:nvGraphicFramePr>
+        <p:xfrm>
+          <a:off x="1066800" y="1714500"/>
+          <a:ext cx="10058400" cy="4457700"/>
+        </p:xfrm>
+        <a:graphic>
+          <a:graphicData uri="http://schemas.openxmlformats.org/drawingml/2006/diagram">
+            <dgm:relIds xmlns:dgm="http://schemas.openxmlformats.org/drawingml/2006/diagram" xmlns:r="http://schemas.openxmlformats.org/officeDocument/2006/relationships" r:dm="rId3" r:lo="rId4" r:qs="rId5" r:cs="rId6"/>
+          </a:graphicData>
+        </a:graphic>
+      </p:graphicFrame>
     </p:spTree>
     <p:extLst>
       <p:ext uri="{BB962C8B-B14F-4D97-AF65-F5344CB8AC3E}">
-        <p14:creationId xmlns:p14="http://schemas.microsoft.com/office/powerpoint/2010/main" val="232024693"/>
+        <p14:creationId xmlns:p14="http://schemas.microsoft.com/office/powerpoint/2010/main" val="3341394575"/>
       </p:ext>
     </p:extLst>
   </p:cSld>
@@ -22540,7 +22653,7 @@
 </file>
 
 <file path=ppt/slides/slide21.xml><?xml version="1.0" encoding="utf-8"?>
-<p:sld xmlns:a="http://schemas.openxmlformats.org/drawingml/2006/main" xmlns:r="http://schemas.openxmlformats.org/officeDocument/2006/relationships" xmlns:p="http://schemas.openxmlformats.org/presentationml/2006/main">
+<p:sld xmlns:a="http://schemas.openxmlformats.org/drawingml/2006/main" xmlns:r="http://schemas.openxmlformats.org/officeDocument/2006/relationships" xmlns:p="http://schemas.openxmlformats.org/presentationml/2006/main" show="0">
   <p:cSld>
     <p:spTree>
       <p:nvGrpSpPr>
@@ -22573,50 +22686,40 @@
           <a:p>
             <a:r>
               <a:rPr lang="en-US" dirty="0"/>
-              <a:t>Analysis</a:t>
+              <a:t>Variables</a:t>
             </a:r>
           </a:p>
         </p:txBody>
       </p:sp>
-      <p:sp>
-        <p:nvSpPr>
-          <p:cNvPr id="3" name="Content Placeholder 2"/>
-          <p:cNvSpPr>
-            <a:spLocks noGrp="1"/>
-          </p:cNvSpPr>
+      <p:graphicFrame>
+        <p:nvGraphicFramePr>
+          <p:cNvPr id="4" name="Content Placeholder 2" descr="Horizontal bullet list showing 3 groups arranged adjacent to one another and bullet points are present under each group"/>
+          <p:cNvGraphicFramePr>
+            <a:graphicFrameLocks noGrp="1"/>
+          </p:cNvGraphicFramePr>
           <p:nvPr>
             <p:ph idx="1"/>
+            <p:extLst>
+              <p:ext uri="{D42A27DB-BD31-4B8C-83A1-F6EECF244321}">
+                <p14:modId xmlns:p14="http://schemas.microsoft.com/office/powerpoint/2010/main" val="1513669856"/>
+              </p:ext>
+            </p:extLst>
           </p:nvPr>
-        </p:nvSpPr>
-        <p:spPr/>
-        <p:txBody>
-          <a:bodyPr/>
-          <a:lstStyle/>
-          <a:p>
-            <a:r>
-              <a:rPr lang="en-US"/>
-              <a:t>First research point</a:t>
-            </a:r>
-          </a:p>
-          <a:p>
-            <a:r>
-              <a:rPr lang="en-US"/>
-              <a:t>Second research point</a:t>
-            </a:r>
-          </a:p>
-          <a:p>
-            <a:r>
-              <a:rPr lang="en-US"/>
-              <a:t>Third research point</a:t>
-            </a:r>
-            <a:endParaRPr lang="en-US" dirty="0"/>
-          </a:p>
-        </p:txBody>
-      </p:sp>
+        </p:nvGraphicFramePr>
+        <p:xfrm>
+          <a:off x="1066800" y="1714500"/>
+          <a:ext cx="10058400" cy="4457700"/>
+        </p:xfrm>
+        <a:graphic>
+          <a:graphicData uri="http://schemas.openxmlformats.org/drawingml/2006/diagram">
+            <dgm:relIds xmlns:dgm="http://schemas.openxmlformats.org/drawingml/2006/diagram" xmlns:r="http://schemas.openxmlformats.org/officeDocument/2006/relationships" r:dm="rId2" r:lo="rId3" r:qs="rId4" r:cs="rId5"/>
+          </a:graphicData>
+        </a:graphic>
+      </p:graphicFrame>
     </p:spTree>
     <p:extLst>
       <p:ext uri="{BB962C8B-B14F-4D97-AF65-F5344CB8AC3E}">
-        <p14:creationId xmlns:p14="http://schemas.microsoft.com/office/powerpoint/2010/main" val="1918831607"/>
+        <p14:creationId xmlns:p14="http://schemas.microsoft.com/office/powerpoint/2010/main" val="588768708"/>
       </p:ext>
     </p:extLst>
   </p:cSld>
@@ -22672,19 +22775,19 @@
           <a:p>
             <a:r>
               <a:rPr lang="en-US" dirty="0"/>
-              <a:t>Feature Importance</a:t>
+              <a:t>Analysis</a:t>
             </a:r>
           </a:p>
         </p:txBody>
       </p:sp>
       <p:sp>
         <p:nvSpPr>
-          <p:cNvPr id="3" name="Content Placeholder 2"/>
+          <p:cNvPr id="3" name="Text Placeholder 2"/>
           <p:cNvSpPr>
             <a:spLocks noGrp="1"/>
           </p:cNvSpPr>
           <p:nvPr>
-            <p:ph idx="1"/>
+            <p:ph type="body" idx="1"/>
           </p:nvPr>
         </p:nvSpPr>
         <p:spPr/>
@@ -22693,29 +22796,20 @@
           <a:lstStyle/>
           <a:p>
             <a:r>
-              <a:rPr lang="en-US"/>
-              <a:t>First research point</a:t>
-            </a:r>
-          </a:p>
-          <a:p>
-            <a:r>
-              <a:rPr lang="en-US"/>
-              <a:t>Second research point</a:t>
-            </a:r>
-          </a:p>
-          <a:p>
-            <a:r>
-              <a:rPr lang="en-US"/>
-              <a:t>Third research point</a:t>
-            </a:r>
-            <a:endParaRPr lang="en-US" dirty="0"/>
+              <a:rPr lang="en-US" dirty="0">
+                <a:solidFill>
+                  <a:schemeClr val="tx1"/>
+                </a:solidFill>
+              </a:rPr>
+              <a:t>Hypothesis</a:t>
+            </a:r>
           </a:p>
         </p:txBody>
       </p:sp>
     </p:spTree>
     <p:extLst>
       <p:ext uri="{BB962C8B-B14F-4D97-AF65-F5344CB8AC3E}">
-        <p14:creationId xmlns:p14="http://schemas.microsoft.com/office/powerpoint/2010/main" val="3778178739"/>
+        <p14:creationId xmlns:p14="http://schemas.microsoft.com/office/powerpoint/2010/main" val="232024693"/>
       </p:ext>
     </p:extLst>
   </p:cSld>
@@ -22771,7 +22865,7 @@
           <a:p>
             <a:r>
               <a:rPr lang="en-US" dirty="0"/>
-              <a:t>Conclusion</a:t>
+              <a:t>Analysis</a:t>
             </a:r>
           </a:p>
         </p:txBody>
@@ -22792,22 +22886,29 @@
           <a:lstStyle/>
           <a:p>
             <a:r>
-              <a:rPr lang="en-US" dirty="0"/>
-              <a:t>Brief summary of what you discovered based on results</a:t>
-            </a:r>
-          </a:p>
-          <a:p>
-            <a:r>
-              <a:rPr lang="en-US" dirty="0"/>
-              <a:t>Indicate and explain whether or not the data supports your hypothesis</a:t>
-            </a:r>
+              <a:rPr lang="en-US"/>
+              <a:t>First research point</a:t>
+            </a:r>
+          </a:p>
+          <a:p>
+            <a:r>
+              <a:rPr lang="en-US"/>
+              <a:t>Second research point</a:t>
+            </a:r>
+          </a:p>
+          <a:p>
+            <a:r>
+              <a:rPr lang="en-US"/>
+              <a:t>Third research point</a:t>
+            </a:r>
+            <a:endParaRPr lang="en-US" dirty="0"/>
           </a:p>
         </p:txBody>
       </p:sp>
     </p:spTree>
     <p:extLst>
       <p:ext uri="{BB962C8B-B14F-4D97-AF65-F5344CB8AC3E}">
-        <p14:creationId xmlns:p14="http://schemas.microsoft.com/office/powerpoint/2010/main" val="2396544352"/>
+        <p14:creationId xmlns:p14="http://schemas.microsoft.com/office/powerpoint/2010/main" val="1918831607"/>
       </p:ext>
     </p:extLst>
   </p:cSld>
@@ -22830,6 +22931,105 @@
 </file>
 
 <file path=ppt/slides/slide24.xml><?xml version="1.0" encoding="utf-8"?>
+<p:sld xmlns:a="http://schemas.openxmlformats.org/drawingml/2006/main" xmlns:r="http://schemas.openxmlformats.org/officeDocument/2006/relationships" xmlns:p="http://schemas.openxmlformats.org/presentationml/2006/main">
+  <p:cSld>
+    <p:spTree>
+      <p:nvGrpSpPr>
+        <p:cNvPr id="1" name=""/>
+        <p:cNvGrpSpPr/>
+        <p:nvPr/>
+      </p:nvGrpSpPr>
+      <p:grpSpPr>
+        <a:xfrm>
+          <a:off x="0" y="0"/>
+          <a:ext cx="0" cy="0"/>
+          <a:chOff x="0" y="0"/>
+          <a:chExt cx="0" cy="0"/>
+        </a:xfrm>
+      </p:grpSpPr>
+      <p:sp>
+        <p:nvSpPr>
+          <p:cNvPr id="2" name="Title 1"/>
+          <p:cNvSpPr>
+            <a:spLocks noGrp="1"/>
+          </p:cNvSpPr>
+          <p:nvPr>
+            <p:ph type="title"/>
+          </p:nvPr>
+        </p:nvSpPr>
+        <p:spPr/>
+        <p:txBody>
+          <a:bodyPr/>
+          <a:lstStyle/>
+          <a:p>
+            <a:r>
+              <a:rPr lang="en-US" dirty="0"/>
+              <a:t>Feature Importance</a:t>
+            </a:r>
+          </a:p>
+        </p:txBody>
+      </p:sp>
+      <p:sp>
+        <p:nvSpPr>
+          <p:cNvPr id="3" name="Content Placeholder 2"/>
+          <p:cNvSpPr>
+            <a:spLocks noGrp="1"/>
+          </p:cNvSpPr>
+          <p:nvPr>
+            <p:ph idx="1"/>
+          </p:nvPr>
+        </p:nvSpPr>
+        <p:spPr/>
+        <p:txBody>
+          <a:bodyPr/>
+          <a:lstStyle/>
+          <a:p>
+            <a:r>
+              <a:rPr lang="en-US"/>
+              <a:t>First research point</a:t>
+            </a:r>
+          </a:p>
+          <a:p>
+            <a:r>
+              <a:rPr lang="en-US"/>
+              <a:t>Second research point</a:t>
+            </a:r>
+          </a:p>
+          <a:p>
+            <a:r>
+              <a:rPr lang="en-US"/>
+              <a:t>Third research point</a:t>
+            </a:r>
+            <a:endParaRPr lang="en-US" dirty="0"/>
+          </a:p>
+        </p:txBody>
+      </p:sp>
+    </p:spTree>
+    <p:extLst>
+      <p:ext uri="{BB962C8B-B14F-4D97-AF65-F5344CB8AC3E}">
+        <p14:creationId xmlns:p14="http://schemas.microsoft.com/office/powerpoint/2010/main" val="3778178739"/>
+      </p:ext>
+    </p:extLst>
+  </p:cSld>
+  <p:clrMapOvr>
+    <a:masterClrMapping/>
+  </p:clrMapOvr>
+  <mc:AlternateContent xmlns:mc="http://schemas.openxmlformats.org/markup-compatibility/2006" xmlns:p14="http://schemas.microsoft.com/office/powerpoint/2010/main">
+    <mc:Choice Requires="p14">
+      <p:transition spd="med" p14:dur="700">
+        <p:fade/>
+      </p:transition>
+    </mc:Choice>
+    <mc:Fallback xmlns="">
+      <p:transition spd="med">
+        <p:fade/>
+      </p:transition>
+    </mc:Fallback>
+  </mc:AlternateContent>
+</p:sld>
+</file>
+
+<file path=ppt/slides/slide25.xml><?xml version="1.0" encoding="utf-8"?>
 <p:sld xmlns:a="http://schemas.openxmlformats.org/drawingml/2006/main" xmlns:r="http://schemas.openxmlformats.org/officeDocument/2006/relationships" xmlns:p="http://schemas.openxmlformats.org/presentationml/2006/main" show="0">
   <p:cSld>
     <p:spTree>
@@ -23224,7 +23424,7 @@
 </p:sld>
 </file>
 
-<file path=ppt/slides/slide25.xml><?xml version="1.0" encoding="utf-8"?>
+<file path=ppt/slides/slide26.xml><?xml version="1.0" encoding="utf-8"?>
 <p:sld xmlns:a="http://schemas.openxmlformats.org/drawingml/2006/main" xmlns:r="http://schemas.openxmlformats.org/officeDocument/2006/relationships" xmlns:p="http://schemas.openxmlformats.org/presentationml/2006/main" show="0">
   <p:cSld>
     <p:spTree>
@@ -23288,119 +23488,6 @@
     <p:extLst>
       <p:ext uri="{BB962C8B-B14F-4D97-AF65-F5344CB8AC3E}">
         <p14:creationId xmlns:p14="http://schemas.microsoft.com/office/powerpoint/2010/main" val="1569005203"/>
-      </p:ext>
-    </p:extLst>
-  </p:cSld>
-  <p:clrMapOvr>
-    <a:masterClrMapping/>
-  </p:clrMapOvr>
-  <mc:AlternateContent xmlns:mc="http://schemas.openxmlformats.org/markup-compatibility/2006" xmlns:p14="http://schemas.microsoft.com/office/powerpoint/2010/main">
-    <mc:Choice Requires="p14">
-      <p:transition spd="med" p14:dur="700">
-        <p:fade/>
-      </p:transition>
-    </mc:Choice>
-    <mc:Fallback xmlns="">
-      <p:transition spd="med">
-        <p:fade/>
-      </p:transition>
-    </mc:Fallback>
-  </mc:AlternateContent>
-</p:sld>
-</file>
-
-<file path=ppt/slides/slide26.xml><?xml version="1.0" encoding="utf-8"?>
-<p:sld xmlns:a="http://schemas.openxmlformats.org/drawingml/2006/main" xmlns:r="http://schemas.openxmlformats.org/officeDocument/2006/relationships" xmlns:p="http://schemas.openxmlformats.org/presentationml/2006/main">
-  <p:cSld>
-    <p:spTree>
-      <p:nvGrpSpPr>
-        <p:cNvPr id="1" name=""/>
-        <p:cNvGrpSpPr/>
-        <p:nvPr/>
-      </p:nvGrpSpPr>
-      <p:grpSpPr>
-        <a:xfrm>
-          <a:off x="0" y="0"/>
-          <a:ext cx="0" cy="0"/>
-          <a:chOff x="0" y="0"/>
-          <a:chExt cx="0" cy="0"/>
-        </a:xfrm>
-      </p:grpSpPr>
-      <p:sp>
-        <p:nvSpPr>
-          <p:cNvPr id="2" name="Title 1"/>
-          <p:cNvSpPr>
-            <a:spLocks noGrp="1"/>
-          </p:cNvSpPr>
-          <p:nvPr>
-            <p:ph type="title"/>
-          </p:nvPr>
-        </p:nvSpPr>
-        <p:spPr/>
-        <p:txBody>
-          <a:bodyPr/>
-          <a:lstStyle/>
-          <a:p>
-            <a:r>
-              <a:rPr lang="en-US"/>
-              <a:t>Data/Observations</a:t>
-            </a:r>
-            <a:endParaRPr lang="en-US" dirty="0"/>
-          </a:p>
-        </p:txBody>
-      </p:sp>
-      <p:sp>
-        <p:nvSpPr>
-          <p:cNvPr id="3" name="Text Placeholder 2"/>
-          <p:cNvSpPr>
-            <a:spLocks noGrp="1"/>
-          </p:cNvSpPr>
-          <p:nvPr>
-            <p:ph type="body" sz="half" idx="2"/>
-          </p:nvPr>
-        </p:nvSpPr>
-        <p:spPr/>
-        <p:txBody>
-          <a:bodyPr/>
-          <a:lstStyle/>
-          <a:p>
-            <a:r>
-              <a:rPr lang="en-US"/>
-              <a:t>Include Observation based on the data from your experiments</a:t>
-            </a:r>
-            <a:endParaRPr lang="en-US" dirty="0"/>
-          </a:p>
-        </p:txBody>
-      </p:sp>
-      <p:graphicFrame>
-        <p:nvGraphicFramePr>
-          <p:cNvPr id="6" name="Content Placeholder 3" descr="Clustered column chart showing the values of 3 series for 4 categories"/>
-          <p:cNvGraphicFramePr>
-            <a:graphicFrameLocks noGrp="1"/>
-          </p:cNvGraphicFramePr>
-          <p:nvPr>
-            <p:ph idx="1"/>
-            <p:extLst>
-              <p:ext uri="{D42A27DB-BD31-4B8C-83A1-F6EECF244321}">
-                <p14:modId xmlns:p14="http://schemas.microsoft.com/office/powerpoint/2010/main" val="1094775993"/>
-              </p:ext>
-            </p:extLst>
-          </p:nvPr>
-        </p:nvGraphicFramePr>
-        <p:xfrm>
-          <a:off x="4699000" y="465138"/>
-          <a:ext cx="7048500" cy="5935662"/>
-        </p:xfrm>
-        <a:graphic>
-          <a:graphicData uri="http://schemas.openxmlformats.org/drawingml/2006/chart">
-            <c:chart xmlns:c="http://schemas.openxmlformats.org/drawingml/2006/chart" xmlns:r="http://schemas.openxmlformats.org/officeDocument/2006/relationships" r:id="rId2"/>
-          </a:graphicData>
-        </a:graphic>
-      </p:graphicFrame>
-    </p:spTree>
-    <p:extLst>
-      <p:ext uri="{BB962C8B-B14F-4D97-AF65-F5344CB8AC3E}">
-        <p14:creationId xmlns:p14="http://schemas.microsoft.com/office/powerpoint/2010/main" val="2605552468"/>
       </p:ext>
     </p:extLst>
   </p:cSld>
@@ -23456,7 +23543,7 @@
           <a:p>
             <a:r>
               <a:rPr lang="en-US"/>
-              <a:t>Works Cited</a:t>
+              <a:t>Data/Observations</a:t>
             </a:r>
             <a:endParaRPr lang="en-US" dirty="0"/>
           </a:p>
@@ -23464,12 +23551,12 @@
       </p:sp>
       <p:sp>
         <p:nvSpPr>
-          <p:cNvPr id="3" name="Content Placeholder 2"/>
+          <p:cNvPr id="3" name="Text Placeholder 2"/>
           <p:cNvSpPr>
             <a:spLocks noGrp="1"/>
           </p:cNvSpPr>
           <p:nvPr>
-            <p:ph idx="1"/>
+            <p:ph type="body" sz="half" idx="2"/>
           </p:nvPr>
         </p:nvSpPr>
         <p:spPr/>
@@ -23478,22 +23565,42 @@
           <a:lstStyle/>
           <a:p>
             <a:r>
-              <a:rPr lang="en-US" dirty="0"/>
-              <a:t>Include print and electronic sources in alphabetical order</a:t>
-            </a:r>
-          </a:p>
-          <a:p>
-            <a:r>
-              <a:rPr lang="en-US" dirty="0"/>
-              <a:t>http://archive.ics.uci.edu/ml/datasets/student+performance</a:t>
-            </a:r>
+              <a:rPr lang="en-US"/>
+              <a:t>Include Observation based on the data from your experiments</a:t>
+            </a:r>
+            <a:endParaRPr lang="en-US" dirty="0"/>
           </a:p>
         </p:txBody>
       </p:sp>
+      <p:graphicFrame>
+        <p:nvGraphicFramePr>
+          <p:cNvPr id="6" name="Content Placeholder 3" descr="Clustered column chart showing the values of 3 series for 4 categories"/>
+          <p:cNvGraphicFramePr>
+            <a:graphicFrameLocks noGrp="1"/>
+          </p:cNvGraphicFramePr>
+          <p:nvPr>
+            <p:ph idx="1"/>
+            <p:extLst>
+              <p:ext uri="{D42A27DB-BD31-4B8C-83A1-F6EECF244321}">
+                <p14:modId xmlns:p14="http://schemas.microsoft.com/office/powerpoint/2010/main" val="1094775993"/>
+              </p:ext>
+            </p:extLst>
+          </p:nvPr>
+        </p:nvGraphicFramePr>
+        <p:xfrm>
+          <a:off x="4699000" y="465138"/>
+          <a:ext cx="7048500" cy="5935662"/>
+        </p:xfrm>
+        <a:graphic>
+          <a:graphicData uri="http://schemas.openxmlformats.org/drawingml/2006/chart">
+            <c:chart xmlns:c="http://schemas.openxmlformats.org/drawingml/2006/chart" xmlns:r="http://schemas.openxmlformats.org/officeDocument/2006/relationships" r:id="rId2"/>
+          </a:graphicData>
+        </a:graphic>
+      </p:graphicFrame>
     </p:spTree>
     <p:extLst>
       <p:ext uri="{BB962C8B-B14F-4D97-AF65-F5344CB8AC3E}">
-        <p14:creationId xmlns:p14="http://schemas.microsoft.com/office/powerpoint/2010/main" val="1074044145"/>
+        <p14:creationId xmlns:p14="http://schemas.microsoft.com/office/powerpoint/2010/main" val="2605552468"/>
       </p:ext>
     </p:extLst>
   </p:cSld>
@@ -23802,15 +23909,7 @@
           <a:p>
             <a:r>
               <a:rPr lang="en-GB" dirty="0"/>
-              <a:t>Created a P/F variable based on </a:t>
-            </a:r>
-            <a:r>
-              <a:rPr lang="en-GB" dirty="0" err="1"/>
-              <a:t>psssing</a:t>
-            </a:r>
-            <a:r>
-              <a:rPr lang="en-GB" dirty="0"/>
-              <a:t> mark for Schools in Portugal ( Exams are scaled on 0-20 with a pass mark of 9.</a:t>
+              <a:t>Created a P/F variable based on passing mark for Schools in Portugal ( Exams are scaled on 0-20 with a pass mark of 9.</a:t>
             </a:r>
           </a:p>
         </p:txBody>
@@ -23908,7 +24007,7 @@
           <a:p>
             <a:r>
               <a:rPr lang="en-US" dirty="0"/>
-              <a:t>Each category was converted into a separate binary variable with a value of either 1 or 0. This increased the number of variables from 32 to 53.</a:t>
+              <a:t>Each factor was converted into a separate binary variable with a value of either 1 or 0. This increased the number of variables from 32 to 53.</a:t>
             </a:r>
           </a:p>
         </p:txBody>

</xml_diff>